<commit_message>
Working build so far.
</commit_message>
<xml_diff>
--- a/SIP_Round1_SIP_Norman-2.pptx
+++ b/SIP_Round1_SIP_Norman-2.pptx
@@ -6,15 +6,16 @@
   </p:sldMasterIdLst>
   <p:sldIdLst>
     <p:sldId id="267" r:id="rId2"/>
-    <p:sldId id="268" r:id="rId3"/>
-    <p:sldId id="269" r:id="rId4"/>
-    <p:sldId id="260" r:id="rId5"/>
-    <p:sldId id="270" r:id="rId6"/>
-    <p:sldId id="272" r:id="rId7"/>
-    <p:sldId id="271" r:id="rId8"/>
-    <p:sldId id="266" r:id="rId9"/>
-    <p:sldId id="264" r:id="rId10"/>
-    <p:sldId id="273" r:id="rId11"/>
+    <p:sldId id="274" r:id="rId3"/>
+    <p:sldId id="268" r:id="rId4"/>
+    <p:sldId id="269" r:id="rId5"/>
+    <p:sldId id="260" r:id="rId6"/>
+    <p:sldId id="270" r:id="rId7"/>
+    <p:sldId id="272" r:id="rId8"/>
+    <p:sldId id="271" r:id="rId9"/>
+    <p:sldId id="266" r:id="rId10"/>
+    <p:sldId id="264" r:id="rId11"/>
+    <p:sldId id="273" r:id="rId12"/>
   </p:sldIdLst>
   <p:sldSz cx="12192000" cy="6858000"/>
   <p:notesSz cx="6858000" cy="9144000"/>
@@ -250,7 +251,7 @@
           <a:p>
             <a:fld id="{736706BA-2FBC-44D1-BC71-B0BEA2B22CF8}" type="datetimeFigureOut">
               <a:rPr lang="en-US" smtClean="0"/>
-              <a:t>12/16/2020</a:t>
+              <a:t>12/17/2020</a:t>
             </a:fld>
             <a:endParaRPr lang="en-US"/>
           </a:p>
@@ -413,7 +414,7 @@
           <a:p>
             <a:fld id="{736706BA-2FBC-44D1-BC71-B0BEA2B22CF8}" type="datetimeFigureOut">
               <a:rPr lang="en-US" smtClean="0"/>
-              <a:t>12/16/2020</a:t>
+              <a:t>12/17/2020</a:t>
             </a:fld>
             <a:endParaRPr lang="en-US"/>
           </a:p>
@@ -586,7 +587,7 @@
           <a:p>
             <a:fld id="{736706BA-2FBC-44D1-BC71-B0BEA2B22CF8}" type="datetimeFigureOut">
               <a:rPr lang="en-US" smtClean="0"/>
-              <a:t>12/16/2020</a:t>
+              <a:t>12/17/2020</a:t>
             </a:fld>
             <a:endParaRPr lang="en-US"/>
           </a:p>
@@ -749,7 +750,7 @@
           <a:p>
             <a:fld id="{736706BA-2FBC-44D1-BC71-B0BEA2B22CF8}" type="datetimeFigureOut">
               <a:rPr lang="en-US" smtClean="0"/>
-              <a:t>12/16/2020</a:t>
+              <a:t>12/17/2020</a:t>
             </a:fld>
             <a:endParaRPr lang="en-US"/>
           </a:p>
@@ -989,7 +990,7 @@
           <a:p>
             <a:fld id="{736706BA-2FBC-44D1-BC71-B0BEA2B22CF8}" type="datetimeFigureOut">
               <a:rPr lang="en-US" smtClean="0"/>
-              <a:t>12/16/2020</a:t>
+              <a:t>12/17/2020</a:t>
             </a:fld>
             <a:endParaRPr lang="en-US"/>
           </a:p>
@@ -1213,7 +1214,7 @@
           <a:p>
             <a:fld id="{736706BA-2FBC-44D1-BC71-B0BEA2B22CF8}" type="datetimeFigureOut">
               <a:rPr lang="en-US" smtClean="0"/>
-              <a:t>12/16/2020</a:t>
+              <a:t>12/17/2020</a:t>
             </a:fld>
             <a:endParaRPr lang="en-US"/>
           </a:p>
@@ -1572,7 +1573,7 @@
           <a:p>
             <a:fld id="{736706BA-2FBC-44D1-BC71-B0BEA2B22CF8}" type="datetimeFigureOut">
               <a:rPr lang="en-US" smtClean="0"/>
-              <a:t>12/16/2020</a:t>
+              <a:t>12/17/2020</a:t>
             </a:fld>
             <a:endParaRPr lang="en-US"/>
           </a:p>
@@ -1684,7 +1685,7 @@
           <a:p>
             <a:fld id="{736706BA-2FBC-44D1-BC71-B0BEA2B22CF8}" type="datetimeFigureOut">
               <a:rPr lang="en-US" smtClean="0"/>
-              <a:t>12/16/2020</a:t>
+              <a:t>12/17/2020</a:t>
             </a:fld>
             <a:endParaRPr lang="en-US"/>
           </a:p>
@@ -1774,7 +1775,7 @@
           <a:p>
             <a:fld id="{736706BA-2FBC-44D1-BC71-B0BEA2B22CF8}" type="datetimeFigureOut">
               <a:rPr lang="en-US" smtClean="0"/>
-              <a:t>12/16/2020</a:t>
+              <a:t>12/17/2020</a:t>
             </a:fld>
             <a:endParaRPr lang="en-US"/>
           </a:p>
@@ -2044,7 +2045,7 @@
           <a:p>
             <a:fld id="{736706BA-2FBC-44D1-BC71-B0BEA2B22CF8}" type="datetimeFigureOut">
               <a:rPr lang="en-US" smtClean="0"/>
-              <a:t>12/16/2020</a:t>
+              <a:t>12/17/2020</a:t>
             </a:fld>
             <a:endParaRPr lang="en-US"/>
           </a:p>
@@ -2291,7 +2292,7 @@
           <a:p>
             <a:fld id="{736706BA-2FBC-44D1-BC71-B0BEA2B22CF8}" type="datetimeFigureOut">
               <a:rPr lang="en-US" smtClean="0"/>
-              <a:t>12/16/2020</a:t>
+              <a:t>12/17/2020</a:t>
             </a:fld>
             <a:endParaRPr lang="en-US"/>
           </a:p>
@@ -2497,7 +2498,7 @@
           <a:p>
             <a:fld id="{736706BA-2FBC-44D1-BC71-B0BEA2B22CF8}" type="datetimeFigureOut">
               <a:rPr lang="en-US" smtClean="0"/>
-              <a:t>12/16/2020</a:t>
+              <a:t>12/17/2020</a:t>
             </a:fld>
             <a:endParaRPr lang="en-US"/>
           </a:p>
@@ -3444,7 +3445,7 @@
               <a:rPr lang="en-US" sz="4000" dirty="0">
                 <a:latin typeface="Century Gothic" panose="020B0502020202020204" pitchFamily="34" charset="0"/>
               </a:rPr>
-              <a:t>Recap</a:t>
+              <a:t>Prior Art</a:t>
             </a:r>
           </a:p>
         </p:txBody>
@@ -3496,7 +3497,7 @@
         </p:spPr>
         <p:txBody>
           <a:bodyPr vert="horz" lIns="91440" tIns="45720" rIns="91440" bIns="45720" rtlCol="0">
-            <a:normAutofit lnSpcReduction="10000"/>
+            <a:normAutofit/>
           </a:bodyPr>
           <a:lstStyle>
             <a:lvl1pPr marL="0" indent="0" algn="ctr" defTabSz="914400" rtl="0" eaLnBrk="1" latinLnBrk="0" hangingPunct="1">
@@ -3666,55 +3667,66 @@
             <a:pPr algn="l"/>
             <a:r>
               <a:rPr lang="en-US" dirty="0"/>
-              <a:t>-Innovation: Innovation claim is To teach complex programming concepts to teens (13-18 year old) in a fun and engaging way in order to achieve greater retention of the concepts.</a:t>
+              <a:t>Swift Playgrounds (iPad App)</a:t>
+            </a:r>
+            <a:r>
+              <a:rPr lang="en-US" dirty="0">
+                <a:hlinkClick r:id="rId4"/>
+              </a:rPr>
+              <a:t> https://www.apple.com/swift/playgrounds/</a:t>
+            </a:r>
+            <a:r>
+              <a:rPr lang="en-US" dirty="0"/>
+              <a:t> </a:t>
             </a:r>
           </a:p>
           <a:p>
             <a:pPr algn="l"/>
             <a:r>
               <a:rPr lang="en-US" dirty="0"/>
-              <a:t>-Represent Array and Linked List</a:t>
+              <a:t>Humongous Entertainment Games </a:t>
+            </a:r>
+            <a:r>
+              <a:rPr lang="en-US" dirty="0">
+                <a:hlinkClick r:id="rId5"/>
+              </a:rPr>
+              <a:t>http://humongous.com/</a:t>
+            </a:r>
+            <a:r>
+              <a:rPr lang="en-US" dirty="0"/>
+              <a:t> </a:t>
             </a:r>
           </a:p>
           <a:p>
             <a:pPr algn="l"/>
             <a:r>
               <a:rPr lang="en-US" dirty="0"/>
-              <a:t>-Pick up objects as memory blocks</a:t>
+              <a:t>Portal </a:t>
+            </a:r>
+            <a:r>
+              <a:rPr lang="en-US" dirty="0">
+                <a:hlinkClick r:id="rId6"/>
+              </a:rPr>
+              <a:t>https://store.steampowered.com/app/400/Portal/</a:t>
+            </a:r>
+            <a:r>
+              <a:rPr lang="en-US" dirty="0"/>
+              <a:t> </a:t>
             </a:r>
           </a:p>
           <a:p>
             <a:pPr algn="l"/>
             <a:r>
               <a:rPr lang="en-US" dirty="0"/>
-              <a:t>-Objectives given from the game to utilized and play under the rules of Data Structure.</a:t>
-            </a:r>
-          </a:p>
-          <a:p>
-            <a:pPr algn="l"/>
-            <a:r>
+              <a:t>Human Resources Machine</a:t>
+            </a:r>
+            <a:br>
               <a:rPr lang="en-US" dirty="0"/>
-              <a:t>-Pointers Teleportation</a:t>
-            </a:r>
-          </a:p>
-          <a:p>
-            <a:pPr algn="l"/>
+            </a:br>
             <a:r>
               <a:rPr lang="en-US" dirty="0"/>
-              <a:t>-Objectives and walkthrough tutorials when playing</a:t>
-            </a:r>
-          </a:p>
-          <a:p>
-            <a:pPr algn="l"/>
-            <a:endParaRPr lang="en-US" dirty="0"/>
-          </a:p>
-          <a:p>
-            <a:pPr algn="l"/>
-            <a:endParaRPr lang="en-US" dirty="0"/>
-          </a:p>
-          <a:p>
-            <a:pPr algn="l"/>
-            <a:endParaRPr lang="en-US" dirty="0"/>
+              <a:t>Stanley Parable </a:t>
+            </a:r>
           </a:p>
           <a:p>
             <a:pPr algn="l"/>
@@ -3912,11 +3924,6 @@
         </p:txBody>
       </p:sp>
     </p:spTree>
-    <p:extLst>
-      <p:ext uri="{BB962C8B-B14F-4D97-AF65-F5344CB8AC3E}">
-        <p14:creationId xmlns:p14="http://schemas.microsoft.com/office/powerpoint/2010/main" val="2940304229"/>
-      </p:ext>
-    </p:extLst>
   </p:cSld>
   <p:clrMapOvr>
     <a:masterClrMapping/>
@@ -3924,7 +3931,7 @@
 </p:sld>
 </file>
 
-<file path=ppt/slides/slide2.xml><?xml version="1.0" encoding="utf-8"?>
+<file path=ppt/slides/slide11.xml><?xml version="1.0" encoding="utf-8"?>
 <p:sld xmlns:a="http://schemas.openxmlformats.org/drawingml/2006/main" xmlns:r="http://schemas.openxmlformats.org/officeDocument/2006/relationships" xmlns:p="http://schemas.openxmlformats.org/presentationml/2006/main">
   <p:cSld>
     <p:spTree>
@@ -4160,7 +4167,7 @@
               <a:rPr lang="en-US" sz="4000" dirty="0">
                 <a:latin typeface="Century Gothic" panose="020B0502020202020204" pitchFamily="34" charset="0"/>
               </a:rPr>
-              <a:t>Technical Field &amp; Background Information</a:t>
+              <a:t>Recap</a:t>
             </a:r>
           </a:p>
         </p:txBody>
@@ -4203,7 +4210,499 @@
         </p:nvSpPr>
         <p:spPr>
           <a:xfrm>
-            <a:off x="1524000" y="2985868"/>
+            <a:off x="665871" y="1294228"/>
+            <a:ext cx="10813365" cy="3528791"/>
+          </a:xfrm>
+          <a:prstGeom prst="rect">
+            <a:avLst/>
+          </a:prstGeom>
+        </p:spPr>
+        <p:txBody>
+          <a:bodyPr vert="horz" lIns="91440" tIns="45720" rIns="91440" bIns="45720" rtlCol="0">
+            <a:normAutofit lnSpcReduction="10000"/>
+          </a:bodyPr>
+          <a:lstStyle>
+            <a:lvl1pPr marL="0" indent="0" algn="ctr" defTabSz="914400" rtl="0" eaLnBrk="1" latinLnBrk="0" hangingPunct="1">
+              <a:lnSpc>
+                <a:spcPct val="90000"/>
+              </a:lnSpc>
+              <a:spcBef>
+                <a:spcPts val="1000"/>
+              </a:spcBef>
+              <a:buFont typeface="Arial" panose="020B0604020202020204" pitchFamily="34" charset="0"/>
+              <a:buNone/>
+              <a:defRPr sz="2400" kern="1200">
+                <a:solidFill>
+                  <a:schemeClr val="tx1"/>
+                </a:solidFill>
+                <a:latin typeface="+mn-lt"/>
+                <a:ea typeface="+mn-ea"/>
+                <a:cs typeface="+mn-cs"/>
+              </a:defRPr>
+            </a:lvl1pPr>
+            <a:lvl2pPr marL="457200" indent="0" algn="ctr" defTabSz="914400" rtl="0" eaLnBrk="1" latinLnBrk="0" hangingPunct="1">
+              <a:lnSpc>
+                <a:spcPct val="90000"/>
+              </a:lnSpc>
+              <a:spcBef>
+                <a:spcPts val="500"/>
+              </a:spcBef>
+              <a:buFont typeface="Arial" panose="020B0604020202020204" pitchFamily="34" charset="0"/>
+              <a:buNone/>
+              <a:defRPr sz="2000" kern="1200">
+                <a:solidFill>
+                  <a:schemeClr val="tx1"/>
+                </a:solidFill>
+                <a:latin typeface="+mn-lt"/>
+                <a:ea typeface="+mn-ea"/>
+                <a:cs typeface="+mn-cs"/>
+              </a:defRPr>
+            </a:lvl2pPr>
+            <a:lvl3pPr marL="914400" indent="0" algn="ctr" defTabSz="914400" rtl="0" eaLnBrk="1" latinLnBrk="0" hangingPunct="1">
+              <a:lnSpc>
+                <a:spcPct val="90000"/>
+              </a:lnSpc>
+              <a:spcBef>
+                <a:spcPts val="500"/>
+              </a:spcBef>
+              <a:buFont typeface="Arial" panose="020B0604020202020204" pitchFamily="34" charset="0"/>
+              <a:buNone/>
+              <a:defRPr sz="1800" kern="1200">
+                <a:solidFill>
+                  <a:schemeClr val="tx1"/>
+                </a:solidFill>
+                <a:latin typeface="+mn-lt"/>
+                <a:ea typeface="+mn-ea"/>
+                <a:cs typeface="+mn-cs"/>
+              </a:defRPr>
+            </a:lvl3pPr>
+            <a:lvl4pPr marL="1371600" indent="0" algn="ctr" defTabSz="914400" rtl="0" eaLnBrk="1" latinLnBrk="0" hangingPunct="1">
+              <a:lnSpc>
+                <a:spcPct val="90000"/>
+              </a:lnSpc>
+              <a:spcBef>
+                <a:spcPts val="500"/>
+              </a:spcBef>
+              <a:buFont typeface="Arial" panose="020B0604020202020204" pitchFamily="34" charset="0"/>
+              <a:buNone/>
+              <a:defRPr sz="1600" kern="1200">
+                <a:solidFill>
+                  <a:schemeClr val="tx1"/>
+                </a:solidFill>
+                <a:latin typeface="+mn-lt"/>
+                <a:ea typeface="+mn-ea"/>
+                <a:cs typeface="+mn-cs"/>
+              </a:defRPr>
+            </a:lvl4pPr>
+            <a:lvl5pPr marL="1828800" indent="0" algn="ctr" defTabSz="914400" rtl="0" eaLnBrk="1" latinLnBrk="0" hangingPunct="1">
+              <a:lnSpc>
+                <a:spcPct val="90000"/>
+              </a:lnSpc>
+              <a:spcBef>
+                <a:spcPts val="500"/>
+              </a:spcBef>
+              <a:buFont typeface="Arial" panose="020B0604020202020204" pitchFamily="34" charset="0"/>
+              <a:buNone/>
+              <a:defRPr sz="1600" kern="1200">
+                <a:solidFill>
+                  <a:schemeClr val="tx1"/>
+                </a:solidFill>
+                <a:latin typeface="+mn-lt"/>
+                <a:ea typeface="+mn-ea"/>
+                <a:cs typeface="+mn-cs"/>
+              </a:defRPr>
+            </a:lvl5pPr>
+            <a:lvl6pPr marL="2286000" indent="0" algn="ctr" defTabSz="914400" rtl="0" eaLnBrk="1" latinLnBrk="0" hangingPunct="1">
+              <a:lnSpc>
+                <a:spcPct val="90000"/>
+              </a:lnSpc>
+              <a:spcBef>
+                <a:spcPts val="500"/>
+              </a:spcBef>
+              <a:buFont typeface="Arial" panose="020B0604020202020204" pitchFamily="34" charset="0"/>
+              <a:buNone/>
+              <a:defRPr sz="1600" kern="1200">
+                <a:solidFill>
+                  <a:schemeClr val="tx1"/>
+                </a:solidFill>
+                <a:latin typeface="+mn-lt"/>
+                <a:ea typeface="+mn-ea"/>
+                <a:cs typeface="+mn-cs"/>
+              </a:defRPr>
+            </a:lvl6pPr>
+            <a:lvl7pPr marL="2743200" indent="0" algn="ctr" defTabSz="914400" rtl="0" eaLnBrk="1" latinLnBrk="0" hangingPunct="1">
+              <a:lnSpc>
+                <a:spcPct val="90000"/>
+              </a:lnSpc>
+              <a:spcBef>
+                <a:spcPts val="500"/>
+              </a:spcBef>
+              <a:buFont typeface="Arial" panose="020B0604020202020204" pitchFamily="34" charset="0"/>
+              <a:buNone/>
+              <a:defRPr sz="1600" kern="1200">
+                <a:solidFill>
+                  <a:schemeClr val="tx1"/>
+                </a:solidFill>
+                <a:latin typeface="+mn-lt"/>
+                <a:ea typeface="+mn-ea"/>
+                <a:cs typeface="+mn-cs"/>
+              </a:defRPr>
+            </a:lvl7pPr>
+            <a:lvl8pPr marL="3200400" indent="0" algn="ctr" defTabSz="914400" rtl="0" eaLnBrk="1" latinLnBrk="0" hangingPunct="1">
+              <a:lnSpc>
+                <a:spcPct val="90000"/>
+              </a:lnSpc>
+              <a:spcBef>
+                <a:spcPts val="500"/>
+              </a:spcBef>
+              <a:buFont typeface="Arial" panose="020B0604020202020204" pitchFamily="34" charset="0"/>
+              <a:buNone/>
+              <a:defRPr sz="1600" kern="1200">
+                <a:solidFill>
+                  <a:schemeClr val="tx1"/>
+                </a:solidFill>
+                <a:latin typeface="+mn-lt"/>
+                <a:ea typeface="+mn-ea"/>
+                <a:cs typeface="+mn-cs"/>
+              </a:defRPr>
+            </a:lvl8pPr>
+            <a:lvl9pPr marL="3657600" indent="0" algn="ctr" defTabSz="914400" rtl="0" eaLnBrk="1" latinLnBrk="0" hangingPunct="1">
+              <a:lnSpc>
+                <a:spcPct val="90000"/>
+              </a:lnSpc>
+              <a:spcBef>
+                <a:spcPts val="500"/>
+              </a:spcBef>
+              <a:buFont typeface="Arial" panose="020B0604020202020204" pitchFamily="34" charset="0"/>
+              <a:buNone/>
+              <a:defRPr sz="1600" kern="1200">
+                <a:solidFill>
+                  <a:schemeClr val="tx1"/>
+                </a:solidFill>
+                <a:latin typeface="+mn-lt"/>
+                <a:ea typeface="+mn-ea"/>
+                <a:cs typeface="+mn-cs"/>
+              </a:defRPr>
+            </a:lvl9pPr>
+          </a:lstStyle>
+          <a:p>
+            <a:pPr algn="l"/>
+            <a:r>
+              <a:rPr lang="en-US" dirty="0"/>
+              <a:t>-Innovation: Innovation claim is To teach complex programming concepts to teens (13-18 year old) in a fun and engaging way in order to achieve greater retention of the concepts.</a:t>
+            </a:r>
+          </a:p>
+          <a:p>
+            <a:pPr algn="l"/>
+            <a:r>
+              <a:rPr lang="en-US" dirty="0"/>
+              <a:t>-Represent Array and Linked List</a:t>
+            </a:r>
+          </a:p>
+          <a:p>
+            <a:pPr algn="l"/>
+            <a:r>
+              <a:rPr lang="en-US" dirty="0"/>
+              <a:t>-Pick up objects as memory blocks</a:t>
+            </a:r>
+          </a:p>
+          <a:p>
+            <a:pPr algn="l"/>
+            <a:r>
+              <a:rPr lang="en-US" dirty="0"/>
+              <a:t>-Objectives given from the game to utilized and play under the rules of Data Structure.</a:t>
+            </a:r>
+          </a:p>
+          <a:p>
+            <a:pPr algn="l"/>
+            <a:r>
+              <a:rPr lang="en-US" dirty="0"/>
+              <a:t>-Pointers Teleportation</a:t>
+            </a:r>
+          </a:p>
+          <a:p>
+            <a:pPr algn="l"/>
+            <a:r>
+              <a:rPr lang="en-US" dirty="0"/>
+              <a:t>-Objectives and walkthrough tutorials when playing</a:t>
+            </a:r>
+          </a:p>
+          <a:p>
+            <a:pPr algn="l"/>
+            <a:endParaRPr lang="en-US" dirty="0"/>
+          </a:p>
+          <a:p>
+            <a:pPr algn="l"/>
+            <a:endParaRPr lang="en-US" dirty="0"/>
+          </a:p>
+          <a:p>
+            <a:pPr algn="l"/>
+            <a:endParaRPr lang="en-US" dirty="0"/>
+          </a:p>
+          <a:p>
+            <a:pPr algn="l"/>
+            <a:endParaRPr lang="en-US" dirty="0"/>
+          </a:p>
+        </p:txBody>
+      </p:sp>
+      <p:sp>
+        <p:nvSpPr>
+          <p:cNvPr id="8" name="Subtitle 2"/>
+          <p:cNvSpPr txBox="1"/>
+          <p:nvPr/>
+        </p:nvSpPr>
+        <p:spPr>
+          <a:xfrm>
+            <a:off x="2717409" y="6261442"/>
+            <a:ext cx="7087772" cy="313006"/>
+          </a:xfrm>
+          <a:prstGeom prst="rect">
+            <a:avLst/>
+          </a:prstGeom>
+        </p:spPr>
+        <p:txBody>
+          <a:bodyPr vert="horz" lIns="91440" tIns="45720" rIns="91440" bIns="45720" rtlCol="0">
+            <a:normAutofit/>
+          </a:bodyPr>
+          <a:lstStyle>
+            <a:lvl1pPr marL="0" indent="0" algn="ctr" defTabSz="914400" rtl="0" eaLnBrk="1" latinLnBrk="0" hangingPunct="1">
+              <a:lnSpc>
+                <a:spcPct val="90000"/>
+              </a:lnSpc>
+              <a:spcBef>
+                <a:spcPts val="1000"/>
+              </a:spcBef>
+              <a:buFont typeface="Arial" panose="020B0604020202020204" pitchFamily="34" charset="0"/>
+              <a:buNone/>
+              <a:defRPr sz="2400" kern="1200">
+                <a:solidFill>
+                  <a:schemeClr val="tx1"/>
+                </a:solidFill>
+                <a:latin typeface="+mn-lt"/>
+                <a:ea typeface="+mn-ea"/>
+                <a:cs typeface="+mn-cs"/>
+              </a:defRPr>
+            </a:lvl1pPr>
+            <a:lvl2pPr marL="457200" indent="0" algn="ctr" defTabSz="914400" rtl="0" eaLnBrk="1" latinLnBrk="0" hangingPunct="1">
+              <a:lnSpc>
+                <a:spcPct val="90000"/>
+              </a:lnSpc>
+              <a:spcBef>
+                <a:spcPts val="500"/>
+              </a:spcBef>
+              <a:buFont typeface="Arial" panose="020B0604020202020204" pitchFamily="34" charset="0"/>
+              <a:buNone/>
+              <a:defRPr sz="2000" kern="1200">
+                <a:solidFill>
+                  <a:schemeClr val="tx1"/>
+                </a:solidFill>
+                <a:latin typeface="+mn-lt"/>
+                <a:ea typeface="+mn-ea"/>
+                <a:cs typeface="+mn-cs"/>
+              </a:defRPr>
+            </a:lvl2pPr>
+            <a:lvl3pPr marL="914400" indent="0" algn="ctr" defTabSz="914400" rtl="0" eaLnBrk="1" latinLnBrk="0" hangingPunct="1">
+              <a:lnSpc>
+                <a:spcPct val="90000"/>
+              </a:lnSpc>
+              <a:spcBef>
+                <a:spcPts val="500"/>
+              </a:spcBef>
+              <a:buFont typeface="Arial" panose="020B0604020202020204" pitchFamily="34" charset="0"/>
+              <a:buNone/>
+              <a:defRPr sz="1800" kern="1200">
+                <a:solidFill>
+                  <a:schemeClr val="tx1"/>
+                </a:solidFill>
+                <a:latin typeface="+mn-lt"/>
+                <a:ea typeface="+mn-ea"/>
+                <a:cs typeface="+mn-cs"/>
+              </a:defRPr>
+            </a:lvl3pPr>
+            <a:lvl4pPr marL="1371600" indent="0" algn="ctr" defTabSz="914400" rtl="0" eaLnBrk="1" latinLnBrk="0" hangingPunct="1">
+              <a:lnSpc>
+                <a:spcPct val="90000"/>
+              </a:lnSpc>
+              <a:spcBef>
+                <a:spcPts val="500"/>
+              </a:spcBef>
+              <a:buFont typeface="Arial" panose="020B0604020202020204" pitchFamily="34" charset="0"/>
+              <a:buNone/>
+              <a:defRPr sz="1600" kern="1200">
+                <a:solidFill>
+                  <a:schemeClr val="tx1"/>
+                </a:solidFill>
+                <a:latin typeface="+mn-lt"/>
+                <a:ea typeface="+mn-ea"/>
+                <a:cs typeface="+mn-cs"/>
+              </a:defRPr>
+            </a:lvl4pPr>
+            <a:lvl5pPr marL="1828800" indent="0" algn="ctr" defTabSz="914400" rtl="0" eaLnBrk="1" latinLnBrk="0" hangingPunct="1">
+              <a:lnSpc>
+                <a:spcPct val="90000"/>
+              </a:lnSpc>
+              <a:spcBef>
+                <a:spcPts val="500"/>
+              </a:spcBef>
+              <a:buFont typeface="Arial" panose="020B0604020202020204" pitchFamily="34" charset="0"/>
+              <a:buNone/>
+              <a:defRPr sz="1600" kern="1200">
+                <a:solidFill>
+                  <a:schemeClr val="tx1"/>
+                </a:solidFill>
+                <a:latin typeface="+mn-lt"/>
+                <a:ea typeface="+mn-ea"/>
+                <a:cs typeface="+mn-cs"/>
+              </a:defRPr>
+            </a:lvl5pPr>
+            <a:lvl6pPr marL="2286000" indent="0" algn="ctr" defTabSz="914400" rtl="0" eaLnBrk="1" latinLnBrk="0" hangingPunct="1">
+              <a:lnSpc>
+                <a:spcPct val="90000"/>
+              </a:lnSpc>
+              <a:spcBef>
+                <a:spcPts val="500"/>
+              </a:spcBef>
+              <a:buFont typeface="Arial" panose="020B0604020202020204" pitchFamily="34" charset="0"/>
+              <a:buNone/>
+              <a:defRPr sz="1600" kern="1200">
+                <a:solidFill>
+                  <a:schemeClr val="tx1"/>
+                </a:solidFill>
+                <a:latin typeface="+mn-lt"/>
+                <a:ea typeface="+mn-ea"/>
+                <a:cs typeface="+mn-cs"/>
+              </a:defRPr>
+            </a:lvl6pPr>
+            <a:lvl7pPr marL="2743200" indent="0" algn="ctr" defTabSz="914400" rtl="0" eaLnBrk="1" latinLnBrk="0" hangingPunct="1">
+              <a:lnSpc>
+                <a:spcPct val="90000"/>
+              </a:lnSpc>
+              <a:spcBef>
+                <a:spcPts val="500"/>
+              </a:spcBef>
+              <a:buFont typeface="Arial" panose="020B0604020202020204" pitchFamily="34" charset="0"/>
+              <a:buNone/>
+              <a:defRPr sz="1600" kern="1200">
+                <a:solidFill>
+                  <a:schemeClr val="tx1"/>
+                </a:solidFill>
+                <a:latin typeface="+mn-lt"/>
+                <a:ea typeface="+mn-ea"/>
+                <a:cs typeface="+mn-cs"/>
+              </a:defRPr>
+            </a:lvl7pPr>
+            <a:lvl8pPr marL="3200400" indent="0" algn="ctr" defTabSz="914400" rtl="0" eaLnBrk="1" latinLnBrk="0" hangingPunct="1">
+              <a:lnSpc>
+                <a:spcPct val="90000"/>
+              </a:lnSpc>
+              <a:spcBef>
+                <a:spcPts val="500"/>
+              </a:spcBef>
+              <a:buFont typeface="Arial" panose="020B0604020202020204" pitchFamily="34" charset="0"/>
+              <a:buNone/>
+              <a:defRPr sz="1600" kern="1200">
+                <a:solidFill>
+                  <a:schemeClr val="tx1"/>
+                </a:solidFill>
+                <a:latin typeface="+mn-lt"/>
+                <a:ea typeface="+mn-ea"/>
+                <a:cs typeface="+mn-cs"/>
+              </a:defRPr>
+            </a:lvl8pPr>
+            <a:lvl9pPr marL="3657600" indent="0" algn="ctr" defTabSz="914400" rtl="0" eaLnBrk="1" latinLnBrk="0" hangingPunct="1">
+              <a:lnSpc>
+                <a:spcPct val="90000"/>
+              </a:lnSpc>
+              <a:spcBef>
+                <a:spcPts val="500"/>
+              </a:spcBef>
+              <a:buFont typeface="Arial" panose="020B0604020202020204" pitchFamily="34" charset="0"/>
+              <a:buNone/>
+              <a:defRPr sz="1600" kern="1200">
+                <a:solidFill>
+                  <a:schemeClr val="tx1"/>
+                </a:solidFill>
+                <a:latin typeface="+mn-lt"/>
+                <a:ea typeface="+mn-ea"/>
+                <a:cs typeface="+mn-cs"/>
+              </a:defRPr>
+            </a:lvl9pPr>
+          </a:lstStyle>
+          <a:p>
+            <a:pPr algn="l"/>
+            <a:endParaRPr lang="en-US" sz="1600" i="1" dirty="0"/>
+          </a:p>
+        </p:txBody>
+      </p:sp>
+    </p:spTree>
+    <p:extLst>
+      <p:ext uri="{BB962C8B-B14F-4D97-AF65-F5344CB8AC3E}">
+        <p14:creationId xmlns:p14="http://schemas.microsoft.com/office/powerpoint/2010/main" val="2940304229"/>
+      </p:ext>
+    </p:extLst>
+  </p:cSld>
+  <p:clrMapOvr>
+    <a:masterClrMapping/>
+  </p:clrMapOvr>
+</p:sld>
+</file>
+
+<file path=ppt/slides/slide2.xml><?xml version="1.0" encoding="utf-8"?>
+<p:sld xmlns:a="http://schemas.openxmlformats.org/drawingml/2006/main" xmlns:r="http://schemas.openxmlformats.org/officeDocument/2006/relationships" xmlns:p="http://schemas.openxmlformats.org/presentationml/2006/main">
+  <p:cSld>
+    <p:spTree>
+      <p:nvGrpSpPr>
+        <p:cNvPr id="1" name=""/>
+        <p:cNvGrpSpPr/>
+        <p:nvPr/>
+      </p:nvGrpSpPr>
+      <p:grpSpPr>
+        <a:xfrm>
+          <a:off x="0" y="0"/>
+          <a:ext cx="0" cy="0"/>
+          <a:chOff x="0" y="0"/>
+          <a:chExt cx="0" cy="0"/>
+        </a:xfrm>
+      </p:grpSpPr>
+      <p:pic>
+        <p:nvPicPr>
+          <p:cNvPr id="7" name="Picture 6"/>
+          <p:cNvPicPr>
+            <a:picLocks noChangeAspect="1"/>
+          </p:cNvPicPr>
+          <p:nvPr/>
+        </p:nvPicPr>
+        <p:blipFill>
+          <a:blip r:embed="rId4">
+            <a:extLst>
+              <a:ext uri="{28A0092B-C50C-407E-A947-70E740481C1C}">
+                <a14:useLocalDpi xmlns:a14="http://schemas.microsoft.com/office/drawing/2010/main" val="0"/>
+              </a:ext>
+            </a:extLst>
+          </a:blip>
+          <a:stretch>
+            <a:fillRect/>
+          </a:stretch>
+        </p:blipFill>
+        <p:spPr>
+          <a:xfrm>
+            <a:off x="0" y="0"/>
+            <a:ext cx="12192000" cy="6858000"/>
+          </a:xfrm>
+          <a:prstGeom prst="rect">
+            <a:avLst/>
+          </a:prstGeom>
+        </p:spPr>
+      </p:pic>
+      <p:sp>
+        <p:nvSpPr>
+          <p:cNvPr id="9" name="Subtitle 2"/>
+          <p:cNvSpPr txBox="1"/>
+          <p:nvPr/>
+        </p:nvSpPr>
+        <p:spPr>
+          <a:xfrm>
+            <a:off x="539261" y="432583"/>
             <a:ext cx="9144000" cy="1318846"/>
           </a:xfrm>
           <a:prstGeom prst="rect">
@@ -4212,6 +4711,230 @@
         </p:spPr>
         <p:txBody>
           <a:bodyPr vert="horz" lIns="91440" tIns="45720" rIns="91440" bIns="45720" rtlCol="0">
+            <a:normAutofit/>
+          </a:bodyPr>
+          <a:lstStyle>
+            <a:lvl1pPr marL="0" indent="0" algn="ctr" defTabSz="914400" rtl="0" eaLnBrk="1" latinLnBrk="0" hangingPunct="1">
+              <a:lnSpc>
+                <a:spcPct val="90000"/>
+              </a:lnSpc>
+              <a:spcBef>
+                <a:spcPts val="1000"/>
+              </a:spcBef>
+              <a:buFont typeface="Arial" panose="020B0604020202020204" pitchFamily="34" charset="0"/>
+              <a:buNone/>
+              <a:defRPr sz="2400" kern="1200">
+                <a:solidFill>
+                  <a:schemeClr val="tx1"/>
+                </a:solidFill>
+                <a:latin typeface="+mn-lt"/>
+                <a:ea typeface="+mn-ea"/>
+                <a:cs typeface="+mn-cs"/>
+              </a:defRPr>
+            </a:lvl1pPr>
+            <a:lvl2pPr marL="457200" indent="0" algn="ctr" defTabSz="914400" rtl="0" eaLnBrk="1" latinLnBrk="0" hangingPunct="1">
+              <a:lnSpc>
+                <a:spcPct val="90000"/>
+              </a:lnSpc>
+              <a:spcBef>
+                <a:spcPts val="500"/>
+              </a:spcBef>
+              <a:buFont typeface="Arial" panose="020B0604020202020204" pitchFamily="34" charset="0"/>
+              <a:buNone/>
+              <a:defRPr sz="2000" kern="1200">
+                <a:solidFill>
+                  <a:schemeClr val="tx1"/>
+                </a:solidFill>
+                <a:latin typeface="+mn-lt"/>
+                <a:ea typeface="+mn-ea"/>
+                <a:cs typeface="+mn-cs"/>
+              </a:defRPr>
+            </a:lvl2pPr>
+            <a:lvl3pPr marL="914400" indent="0" algn="ctr" defTabSz="914400" rtl="0" eaLnBrk="1" latinLnBrk="0" hangingPunct="1">
+              <a:lnSpc>
+                <a:spcPct val="90000"/>
+              </a:lnSpc>
+              <a:spcBef>
+                <a:spcPts val="500"/>
+              </a:spcBef>
+              <a:buFont typeface="Arial" panose="020B0604020202020204" pitchFamily="34" charset="0"/>
+              <a:buNone/>
+              <a:defRPr sz="1800" kern="1200">
+                <a:solidFill>
+                  <a:schemeClr val="tx1"/>
+                </a:solidFill>
+                <a:latin typeface="+mn-lt"/>
+                <a:ea typeface="+mn-ea"/>
+                <a:cs typeface="+mn-cs"/>
+              </a:defRPr>
+            </a:lvl3pPr>
+            <a:lvl4pPr marL="1371600" indent="0" algn="ctr" defTabSz="914400" rtl="0" eaLnBrk="1" latinLnBrk="0" hangingPunct="1">
+              <a:lnSpc>
+                <a:spcPct val="90000"/>
+              </a:lnSpc>
+              <a:spcBef>
+                <a:spcPts val="500"/>
+              </a:spcBef>
+              <a:buFont typeface="Arial" panose="020B0604020202020204" pitchFamily="34" charset="0"/>
+              <a:buNone/>
+              <a:defRPr sz="1600" kern="1200">
+                <a:solidFill>
+                  <a:schemeClr val="tx1"/>
+                </a:solidFill>
+                <a:latin typeface="+mn-lt"/>
+                <a:ea typeface="+mn-ea"/>
+                <a:cs typeface="+mn-cs"/>
+              </a:defRPr>
+            </a:lvl4pPr>
+            <a:lvl5pPr marL="1828800" indent="0" algn="ctr" defTabSz="914400" rtl="0" eaLnBrk="1" latinLnBrk="0" hangingPunct="1">
+              <a:lnSpc>
+                <a:spcPct val="90000"/>
+              </a:lnSpc>
+              <a:spcBef>
+                <a:spcPts val="500"/>
+              </a:spcBef>
+              <a:buFont typeface="Arial" panose="020B0604020202020204" pitchFamily="34" charset="0"/>
+              <a:buNone/>
+              <a:defRPr sz="1600" kern="1200">
+                <a:solidFill>
+                  <a:schemeClr val="tx1"/>
+                </a:solidFill>
+                <a:latin typeface="+mn-lt"/>
+                <a:ea typeface="+mn-ea"/>
+                <a:cs typeface="+mn-cs"/>
+              </a:defRPr>
+            </a:lvl5pPr>
+            <a:lvl6pPr marL="2286000" indent="0" algn="ctr" defTabSz="914400" rtl="0" eaLnBrk="1" latinLnBrk="0" hangingPunct="1">
+              <a:lnSpc>
+                <a:spcPct val="90000"/>
+              </a:lnSpc>
+              <a:spcBef>
+                <a:spcPts val="500"/>
+              </a:spcBef>
+              <a:buFont typeface="Arial" panose="020B0604020202020204" pitchFamily="34" charset="0"/>
+              <a:buNone/>
+              <a:defRPr sz="1600" kern="1200">
+                <a:solidFill>
+                  <a:schemeClr val="tx1"/>
+                </a:solidFill>
+                <a:latin typeface="+mn-lt"/>
+                <a:ea typeface="+mn-ea"/>
+                <a:cs typeface="+mn-cs"/>
+              </a:defRPr>
+            </a:lvl6pPr>
+            <a:lvl7pPr marL="2743200" indent="0" algn="ctr" defTabSz="914400" rtl="0" eaLnBrk="1" latinLnBrk="0" hangingPunct="1">
+              <a:lnSpc>
+                <a:spcPct val="90000"/>
+              </a:lnSpc>
+              <a:spcBef>
+                <a:spcPts val="500"/>
+              </a:spcBef>
+              <a:buFont typeface="Arial" panose="020B0604020202020204" pitchFamily="34" charset="0"/>
+              <a:buNone/>
+              <a:defRPr sz="1600" kern="1200">
+                <a:solidFill>
+                  <a:schemeClr val="tx1"/>
+                </a:solidFill>
+                <a:latin typeface="+mn-lt"/>
+                <a:ea typeface="+mn-ea"/>
+                <a:cs typeface="+mn-cs"/>
+              </a:defRPr>
+            </a:lvl7pPr>
+            <a:lvl8pPr marL="3200400" indent="0" algn="ctr" defTabSz="914400" rtl="0" eaLnBrk="1" latinLnBrk="0" hangingPunct="1">
+              <a:lnSpc>
+                <a:spcPct val="90000"/>
+              </a:lnSpc>
+              <a:spcBef>
+                <a:spcPts val="500"/>
+              </a:spcBef>
+              <a:buFont typeface="Arial" panose="020B0604020202020204" pitchFamily="34" charset="0"/>
+              <a:buNone/>
+              <a:defRPr sz="1600" kern="1200">
+                <a:solidFill>
+                  <a:schemeClr val="tx1"/>
+                </a:solidFill>
+                <a:latin typeface="+mn-lt"/>
+                <a:ea typeface="+mn-ea"/>
+                <a:cs typeface="+mn-cs"/>
+              </a:defRPr>
+            </a:lvl8pPr>
+            <a:lvl9pPr marL="3657600" indent="0" algn="ctr" defTabSz="914400" rtl="0" eaLnBrk="1" latinLnBrk="0" hangingPunct="1">
+              <a:lnSpc>
+                <a:spcPct val="90000"/>
+              </a:lnSpc>
+              <a:spcBef>
+                <a:spcPts val="500"/>
+              </a:spcBef>
+              <a:buFont typeface="Arial" panose="020B0604020202020204" pitchFamily="34" charset="0"/>
+              <a:buNone/>
+              <a:defRPr sz="1600" kern="1200">
+                <a:solidFill>
+                  <a:schemeClr val="tx1"/>
+                </a:solidFill>
+                <a:latin typeface="+mn-lt"/>
+                <a:ea typeface="+mn-ea"/>
+                <a:cs typeface="+mn-cs"/>
+              </a:defRPr>
+            </a:lvl9pPr>
+          </a:lstStyle>
+          <a:p>
+            <a:pPr algn="l"/>
+            <a:r>
+              <a:rPr lang="en-US" sz="4000" dirty="0">
+                <a:latin typeface="Century Gothic" panose="020B0502020202020204" pitchFamily="34" charset="0"/>
+              </a:rPr>
+              <a:t>How it all started?</a:t>
+            </a:r>
+          </a:p>
+        </p:txBody>
+      </p:sp>
+      <p:pic>
+        <p:nvPicPr>
+          <p:cNvPr id="11" name="Picture 10" descr="A black sign with white text&#10;&#10;Description automatically generated"/>
+          <p:cNvPicPr>
+            <a:picLocks noChangeAspect="1"/>
+          </p:cNvPicPr>
+          <p:nvPr/>
+        </p:nvPicPr>
+        <p:blipFill>
+          <a:blip r:embed="rId5">
+            <a:extLst>
+              <a:ext uri="{28A0092B-C50C-407E-A947-70E740481C1C}">
+                <a14:useLocalDpi xmlns:a14="http://schemas.microsoft.com/office/drawing/2010/main" val="0"/>
+              </a:ext>
+            </a:extLst>
+          </a:blip>
+          <a:stretch>
+            <a:fillRect/>
+          </a:stretch>
+        </p:blipFill>
+        <p:spPr>
+          <a:xfrm>
+            <a:off x="425621" y="5106571"/>
+            <a:ext cx="1446907" cy="1467877"/>
+          </a:xfrm>
+          <a:prstGeom prst="rect">
+            <a:avLst/>
+          </a:prstGeom>
+        </p:spPr>
+      </p:pic>
+      <p:sp>
+        <p:nvSpPr>
+          <p:cNvPr id="6" name="Subtitle 2"/>
+          <p:cNvSpPr txBox="1"/>
+          <p:nvPr/>
+        </p:nvSpPr>
+        <p:spPr>
+          <a:xfrm>
+            <a:off x="1523999" y="1665068"/>
+            <a:ext cx="9144000" cy="1318846"/>
+          </a:xfrm>
+          <a:prstGeom prst="rect">
+            <a:avLst/>
+          </a:prstGeom>
+        </p:spPr>
+        <p:txBody>
+          <a:bodyPr vert="horz" lIns="91440" tIns="45720" rIns="91440" bIns="45720" rtlCol="0">
             <a:noAutofit/>
           </a:bodyPr>
           <a:lstStyle>
@@ -4382,31 +5105,186 @@
             <a:pPr algn="l"/>
             <a:r>
               <a:rPr lang="en-US" dirty="0"/>
-              <a:t>Focuses on the design and technical field of game programming.</a:t>
+              <a:t>It all started of a conversation with an uncle about giving an idea of educational games. It happen when I see programming as a tough subject even for beginners. But there are many people to this day that don’t know much of other programming aspects.</a:t>
             </a:r>
           </a:p>
           <a:p>
             <a:pPr algn="l"/>
             <a:endParaRPr lang="en-US" dirty="0"/>
           </a:p>
-          <a:p>
-            <a:pPr algn="l"/>
-            <a:r>
-              <a:rPr lang="en-US" dirty="0"/>
-              <a:t>This was inspired by the early educational games that were on the early PC games and simulation interactive games.</a:t>
-            </a:r>
-          </a:p>
-          <a:p>
-            <a:pPr algn="l"/>
-            <a:endParaRPr lang="en-US" dirty="0"/>
-          </a:p>
-        </p:txBody>
-      </p:sp>
+        </p:txBody>
+      </p:sp>
+      <p:pic>
+        <p:nvPicPr>
+          <p:cNvPr id="3" name="Picture 2">
+            <a:extLst>
+              <a:ext uri="{FF2B5EF4-FFF2-40B4-BE49-F238E27FC236}">
+                <a16:creationId xmlns:a16="http://schemas.microsoft.com/office/drawing/2014/main" id="{101192D4-F78A-4EE9-8B32-9A057CB4AC20}"/>
+              </a:ext>
+            </a:extLst>
+          </p:cNvPr>
+          <p:cNvPicPr>
+            <a:picLocks noChangeAspect="1"/>
+          </p:cNvPicPr>
+          <p:nvPr/>
+        </p:nvPicPr>
+        <p:blipFill>
+          <a:blip r:embed="rId6">
+            <a:extLst>
+              <a:ext uri="{28A0092B-C50C-407E-A947-70E740481C1C}">
+                <a14:useLocalDpi xmlns:a14="http://schemas.microsoft.com/office/drawing/2010/main" val="0"/>
+              </a:ext>
+            </a:extLst>
+          </a:blip>
+          <a:stretch>
+            <a:fillRect/>
+          </a:stretch>
+        </p:blipFill>
+        <p:spPr>
+          <a:xfrm>
+            <a:off x="4010289" y="3429000"/>
+            <a:ext cx="4171421" cy="2780947"/>
+          </a:xfrm>
+          <a:prstGeom prst="rect">
+            <a:avLst/>
+          </a:prstGeom>
+        </p:spPr>
+      </p:pic>
+      <p:pic>
+        <p:nvPicPr>
+          <p:cNvPr id="4" name="Audio 3">
+            <a:hlinkClick r:id="" action="ppaction://media"/>
+            <a:extLst>
+              <a:ext uri="{FF2B5EF4-FFF2-40B4-BE49-F238E27FC236}">
+                <a16:creationId xmlns:a16="http://schemas.microsoft.com/office/drawing/2014/main" id="{A0E002D3-7BBA-4BD8-8790-3F83E84C547C}"/>
+              </a:ext>
+            </a:extLst>
+          </p:cNvPr>
+          <p:cNvPicPr>
+            <a:picLocks noChangeAspect="1"/>
+          </p:cNvPicPr>
+          <p:nvPr>
+            <a:audioFile r:link="rId2"/>
+            <p:extLst>
+              <p:ext uri="{DAA4B4D4-6D71-4841-9C94-3DE7FCFB9230}">
+                <p14:media xmlns:p14="http://schemas.microsoft.com/office/powerpoint/2010/main" r:embed="rId1"/>
+              </p:ext>
+            </p:extLst>
+          </p:nvPr>
+        </p:nvPicPr>
+        <p:blipFill>
+          <a:blip r:embed="rId7"/>
+          <a:stretch>
+            <a:fillRect/>
+          </a:stretch>
+        </p:blipFill>
+        <p:spPr>
+          <a:xfrm>
+            <a:off x="11633200" y="6299200"/>
+            <a:ext cx="406400" cy="406400"/>
+          </a:xfrm>
+          <a:prstGeom prst="rect">
+            <a:avLst/>
+          </a:prstGeom>
+        </p:spPr>
+      </p:pic>
     </p:spTree>
+    <p:extLst>
+      <p:ext uri="{BB962C8B-B14F-4D97-AF65-F5344CB8AC3E}">
+        <p14:creationId xmlns:p14="http://schemas.microsoft.com/office/powerpoint/2010/main" val="3604242684"/>
+      </p:ext>
+    </p:extLst>
   </p:cSld>
   <p:clrMapOvr>
     <a:masterClrMapping/>
   </p:clrMapOvr>
+  <p:timing>
+    <p:tnLst>
+      <p:par>
+        <p:cTn id="1" dur="indefinite" restart="never" nodeType="tmRoot">
+          <p:childTnLst>
+            <p:seq concurrent="1" nextAc="seek">
+              <p:cTn id="2" dur="indefinite" nodeType="mainSeq">
+                <p:childTnLst>
+                  <p:par>
+                    <p:cTn id="3" fill="hold">
+                      <p:stCondLst>
+                        <p:cond delay="indefinite"/>
+                        <p:cond evt="onBegin" delay="0">
+                          <p:tn val="2"/>
+                        </p:cond>
+                      </p:stCondLst>
+                      <p:childTnLst>
+                        <p:par>
+                          <p:cTn id="4" fill="hold">
+                            <p:stCondLst>
+                              <p:cond delay="0"/>
+                            </p:stCondLst>
+                            <p:childTnLst>
+                              <p:par>
+                                <p:cTn id="5" presetID="1" presetClass="mediacall" presetSubtype="0" fill="hold" nodeType="afterEffect">
+                                  <p:stCondLst>
+                                    <p:cond delay="0"/>
+                                  </p:stCondLst>
+                                  <p:childTnLst>
+                                    <p:cmd type="call" cmd="playFrom(0.0)">
+                                      <p:cBhvr>
+                                        <p:cTn id="6" dur="1" fill="hold"/>
+                                        <p:tgtEl>
+                                          <p:spTgt spid="4"/>
+                                        </p:tgtEl>
+                                      </p:cBhvr>
+                                    </p:cmd>
+                                  </p:childTnLst>
+                                </p:cTn>
+                              </p:par>
+                            </p:childTnLst>
+                          </p:cTn>
+                        </p:par>
+                      </p:childTnLst>
+                    </p:cTn>
+                  </p:par>
+                </p:childTnLst>
+              </p:cTn>
+              <p:prevCondLst>
+                <p:cond evt="onPrev" delay="0">
+                  <p:tgtEl>
+                    <p:sldTgt/>
+                  </p:tgtEl>
+                </p:cond>
+              </p:prevCondLst>
+              <p:nextCondLst>
+                <p:cond evt="onNext" delay="0">
+                  <p:tgtEl>
+                    <p:sldTgt/>
+                  </p:tgtEl>
+                </p:cond>
+              </p:nextCondLst>
+            </p:seq>
+            <p:audio isNarration="1">
+              <p:cMediaNode vol="80000" showWhenStopped="0">
+                <p:cTn id="7" fill="hold" display="0">
+                  <p:stCondLst>
+                    <p:cond delay="indefinite"/>
+                  </p:stCondLst>
+                  <p:endCondLst>
+                    <p:cond evt="onStopAudio" delay="0">
+                      <p:tgtEl>
+                        <p:sldTgt/>
+                      </p:tgtEl>
+                    </p:cond>
+                  </p:endCondLst>
+                </p:cTn>
+                <p:tgtEl>
+                  <p:spTgt spid="4"/>
+                </p:tgtEl>
+              </p:cMediaNode>
+            </p:audio>
+          </p:childTnLst>
+        </p:cTn>
+      </p:par>
+    </p:tnLst>
+  </p:timing>
 </p:sld>
 </file>
 
@@ -4646,7 +5524,7 @@
               <a:rPr lang="en-US" sz="4000" dirty="0">
                 <a:latin typeface="Century Gothic" panose="020B0502020202020204" pitchFamily="34" charset="0"/>
               </a:rPr>
-              <a:t>Project Description</a:t>
+              <a:t>Technical Field &amp; Background Information</a:t>
             </a:r>
           </a:p>
         </p:txBody>
@@ -4868,7 +5746,18 @@
             <a:pPr algn="l"/>
             <a:r>
               <a:rPr lang="en-US" dirty="0"/>
-              <a:t>The project is a 3D puzzle game that utilized a visual representation of data structures in a fun yet understanding way by giving them set of mini games and challenges.</a:t>
+              <a:t>Focuses on the design and technical field of game programming.</a:t>
+            </a:r>
+          </a:p>
+          <a:p>
+            <a:pPr algn="l"/>
+            <a:endParaRPr lang="en-US" dirty="0"/>
+          </a:p>
+          <a:p>
+            <a:pPr algn="l"/>
+            <a:r>
+              <a:rPr lang="en-US" dirty="0"/>
+              <a:t>This was inspired by the early educational games that were on the early PC games and simulation interactive games.</a:t>
             </a:r>
           </a:p>
           <a:p>
@@ -5121,7 +6010,7 @@
               <a:rPr lang="en-US" sz="4000" dirty="0">
                 <a:latin typeface="Century Gothic" panose="020B0502020202020204" pitchFamily="34" charset="0"/>
               </a:rPr>
-              <a:t>Innovation Claim</a:t>
+              <a:t>Project Description</a:t>
             </a:r>
           </a:p>
         </p:txBody>
@@ -5340,13 +6229,15 @@
             </a:lvl9pPr>
           </a:lstStyle>
           <a:p>
-            <a:r>
-              <a:rPr lang="en-US" sz="3600" dirty="0"/>
-              <a:t>Innovation claim is To teach complex programming concepts to teens (13-18 year old) in a fun and engaging way in order to achieve greater retention of the concepts.</a:t>
-            </a:r>
-          </a:p>
-          <a:p>
-            <a:endParaRPr lang="en-US" sz="3600" dirty="0"/>
+            <a:pPr algn="l"/>
+            <a:r>
+              <a:rPr lang="en-US" dirty="0"/>
+              <a:t>The project is a 3D puzzle game that utilized a visual representation of data structures in a fun yet understanding way by giving them set of mini games and challenges.</a:t>
+            </a:r>
+          </a:p>
+          <a:p>
+            <a:pPr algn="l"/>
+            <a:endParaRPr lang="en-US" dirty="0"/>
           </a:p>
         </p:txBody>
       </p:sp>
@@ -5407,55 +6298,14 @@
       </p:pic>
       <p:sp>
         <p:nvSpPr>
-          <p:cNvPr id="2" name="Rectangle: Rounded Corners 1"/>
-          <p:cNvSpPr/>
+          <p:cNvPr id="9" name="Subtitle 2"/>
+          <p:cNvSpPr txBox="1"/>
           <p:nvPr/>
         </p:nvSpPr>
         <p:spPr>
           <a:xfrm>
-            <a:off x="506437" y="407962"/>
-            <a:ext cx="11071274" cy="6063175"/>
-          </a:xfrm>
-          <a:prstGeom prst="roundRect">
-            <a:avLst/>
-          </a:prstGeom>
-          <a:noFill/>
-        </p:spPr>
-        <p:style>
-          <a:lnRef idx="2">
-            <a:schemeClr val="accent1">
-              <a:shade val="50000"/>
-            </a:schemeClr>
-          </a:lnRef>
-          <a:fillRef idx="1">
-            <a:schemeClr val="accent1"/>
-          </a:fillRef>
-          <a:effectRef idx="0">
-            <a:schemeClr val="accent1"/>
-          </a:effectRef>
-          <a:fontRef idx="minor">
-            <a:schemeClr val="lt1"/>
-          </a:fontRef>
-        </p:style>
-        <p:txBody>
-          <a:bodyPr rtlCol="0" anchor="ctr"/>
-          <a:lstStyle/>
-          <a:p>
-            <a:pPr algn="ctr"/>
-            <a:endParaRPr lang="en-US"/>
-          </a:p>
-        </p:txBody>
-      </p:sp>
-      <p:sp>
-        <p:nvSpPr>
-          <p:cNvPr id="8" name="Subtitle 2"/>
-          <p:cNvSpPr txBox="1"/>
-          <p:nvPr/>
-        </p:nvSpPr>
-        <p:spPr>
-          <a:xfrm>
-            <a:off x="1470025" y="5111115"/>
-            <a:ext cx="9144000" cy="1292225"/>
+            <a:off x="539261" y="432583"/>
+            <a:ext cx="9144000" cy="1318846"/>
           </a:xfrm>
           <a:prstGeom prst="rect">
             <a:avLst/>
@@ -5630,397 +6480,240 @@
             </a:lvl9pPr>
           </a:lstStyle>
           <a:p>
-            <a:pPr marL="342900" indent="-342900" algn="l">
-              <a:buFont typeface="Arial" panose="020B0604020202020204" pitchFamily="34" charset="0"/>
-              <a:buChar char="•"/>
-            </a:pPr>
-            <a:endParaRPr lang="en-US" dirty="0"/>
-          </a:p>
-        </p:txBody>
-      </p:sp>
-      <p:sp>
-        <p:nvSpPr>
-          <p:cNvPr id="9" name="Rectangle 8">
+            <a:pPr algn="l"/>
+            <a:r>
+              <a:rPr lang="en-US" sz="4000" dirty="0">
+                <a:latin typeface="Century Gothic" panose="020B0502020202020204" pitchFamily="34" charset="0"/>
+              </a:rPr>
+              <a:t>Innovation Claim</a:t>
+            </a:r>
+          </a:p>
+        </p:txBody>
+      </p:sp>
+      <p:pic>
+        <p:nvPicPr>
+          <p:cNvPr id="11" name="Picture 10" descr="A black sign with white text&#10;&#10;Description automatically generated"/>
+          <p:cNvPicPr>
+            <a:picLocks noChangeAspect="1"/>
+          </p:cNvPicPr>
+          <p:nvPr/>
+        </p:nvPicPr>
+        <p:blipFill>
+          <a:blip r:embed="rId3">
             <a:extLst>
-              <a:ext uri="{FF2B5EF4-FFF2-40B4-BE49-F238E27FC236}">
-                <a16:creationId xmlns:a16="http://schemas.microsoft.com/office/drawing/2014/main" id="{AB9E11C4-D162-4905-8CEA-8AB93360DA98}"/>
+              <a:ext uri="{28A0092B-C50C-407E-A947-70E740481C1C}">
+                <a14:useLocalDpi xmlns:a14="http://schemas.microsoft.com/office/drawing/2010/main" val="0"/>
               </a:ext>
             </a:extLst>
-          </p:cNvPr>
-          <p:cNvSpPr/>
-          <p:nvPr/>
-        </p:nvSpPr>
+          </a:blip>
+          <a:stretch>
+            <a:fillRect/>
+          </a:stretch>
+        </p:blipFill>
         <p:spPr>
           <a:xfrm>
-            <a:off x="3174437" y="428504"/>
-            <a:ext cx="9144000" cy="646331"/>
+            <a:off x="425621" y="5106571"/>
+            <a:ext cx="1446907" cy="1467877"/>
           </a:xfrm>
           <a:prstGeom prst="rect">
             <a:avLst/>
           </a:prstGeom>
         </p:spPr>
-        <p:txBody>
-          <a:bodyPr wrap="square">
-            <a:spAutoFit/>
+      </p:pic>
+      <p:sp>
+        <p:nvSpPr>
+          <p:cNvPr id="6" name="Subtitle 2"/>
+          <p:cNvSpPr txBox="1"/>
+          <p:nvPr/>
+        </p:nvSpPr>
+        <p:spPr>
+          <a:xfrm>
+            <a:off x="1524000" y="2985868"/>
+            <a:ext cx="9144000" cy="1318846"/>
+          </a:xfrm>
+          <a:prstGeom prst="rect">
+            <a:avLst/>
+          </a:prstGeom>
+        </p:spPr>
+        <p:txBody>
+          <a:bodyPr vert="horz" lIns="91440" tIns="45720" rIns="91440" bIns="45720" rtlCol="0">
+            <a:noAutofit/>
           </a:bodyPr>
-          <a:lstStyle/>
-          <a:p>
-            <a:r>
-              <a:rPr lang="en-US" sz="3600" dirty="0">
-                <a:latin typeface="Century Gothic" panose="020B0502020202020204" pitchFamily="34" charset="0"/>
-              </a:rPr>
-              <a:t>Arrays and Linked List</a:t>
-            </a:r>
-          </a:p>
-        </p:txBody>
-      </p:sp>
-      <p:graphicFrame>
-        <p:nvGraphicFramePr>
-          <p:cNvPr id="3" name="Table 4">
-            <a:extLst>
-              <a:ext uri="{FF2B5EF4-FFF2-40B4-BE49-F238E27FC236}">
-                <a16:creationId xmlns:a16="http://schemas.microsoft.com/office/drawing/2014/main" id="{C36BD3E0-F261-4D3C-9066-9A0FB4EAE0C0}"/>
-              </a:ext>
-            </a:extLst>
-          </p:cNvPr>
-          <p:cNvGraphicFramePr>
-            <a:graphicFrameLocks noGrp="1"/>
-          </p:cNvGraphicFramePr>
-          <p:nvPr/>
-        </p:nvGraphicFramePr>
-        <p:xfrm>
-          <a:off x="2032000" y="719666"/>
-          <a:ext cx="8127999" cy="2966720"/>
-        </p:xfrm>
-        <a:graphic>
-          <a:graphicData uri="http://schemas.openxmlformats.org/drawingml/2006/table">
-            <a:tbl>
-              <a:tblPr firstRow="1" bandRow="1">
-                <a:tableStyleId>{5C22544A-7EE6-4342-B048-85BDC9FD1C3A}</a:tableStyleId>
-              </a:tblPr>
-              <a:tblGrid>
-                <a:gridCol w="2709333">
-                  <a:extLst>
-                    <a:ext uri="{9D8B030D-6E8A-4147-A177-3AD203B41FA5}">
-                      <a16:colId xmlns:a16="http://schemas.microsoft.com/office/drawing/2014/main" val="2456914658"/>
-                    </a:ext>
-                  </a:extLst>
-                </a:gridCol>
-                <a:gridCol w="2709333">
-                  <a:extLst>
-                    <a:ext uri="{9D8B030D-6E8A-4147-A177-3AD203B41FA5}">
-                      <a16:colId xmlns:a16="http://schemas.microsoft.com/office/drawing/2014/main" val="1125346285"/>
-                    </a:ext>
-                  </a:extLst>
-                </a:gridCol>
-                <a:gridCol w="2709333">
-                  <a:extLst>
-                    <a:ext uri="{9D8B030D-6E8A-4147-A177-3AD203B41FA5}">
-                      <a16:colId xmlns:a16="http://schemas.microsoft.com/office/drawing/2014/main" val="227192875"/>
-                    </a:ext>
-                  </a:extLst>
-                </a:gridCol>
-              </a:tblGrid>
-              <a:tr h="370840">
-                <a:tc>
-                  <a:txBody>
-                    <a:bodyPr/>
-                    <a:lstStyle/>
-                    <a:p>
-                      <a:endParaRPr lang="en-US" dirty="0"/>
-                    </a:p>
-                  </a:txBody>
-                  <a:tcPr/>
-                </a:tc>
-                <a:tc>
-                  <a:txBody>
-                    <a:bodyPr/>
-                    <a:lstStyle/>
-                    <a:p>
-                      <a:endParaRPr lang="en-US"/>
-                    </a:p>
-                  </a:txBody>
-                  <a:tcPr/>
-                </a:tc>
-                <a:tc>
-                  <a:txBody>
-                    <a:bodyPr/>
-                    <a:lstStyle/>
-                    <a:p>
-                      <a:endParaRPr lang="en-US"/>
-                    </a:p>
-                  </a:txBody>
-                  <a:tcPr/>
-                </a:tc>
-                <a:extLst>
-                  <a:ext uri="{0D108BD9-81ED-4DB2-BD59-A6C34878D82A}">
-                    <a16:rowId xmlns:a16="http://schemas.microsoft.com/office/drawing/2014/main" val="3290302217"/>
-                  </a:ext>
-                </a:extLst>
-              </a:tr>
-              <a:tr h="370840">
-                <a:tc>
-                  <a:txBody>
-                    <a:bodyPr/>
-                    <a:lstStyle/>
-                    <a:p>
-                      <a:endParaRPr lang="en-US"/>
-                    </a:p>
-                  </a:txBody>
-                  <a:tcPr/>
-                </a:tc>
-                <a:tc>
-                  <a:txBody>
-                    <a:bodyPr/>
-                    <a:lstStyle/>
-                    <a:p>
-                      <a:endParaRPr lang="en-US" dirty="0"/>
-                    </a:p>
-                  </a:txBody>
-                  <a:tcPr/>
-                </a:tc>
-                <a:tc>
-                  <a:txBody>
-                    <a:bodyPr/>
-                    <a:lstStyle/>
-                    <a:p>
-                      <a:endParaRPr lang="en-US"/>
-                    </a:p>
-                  </a:txBody>
-                  <a:tcPr/>
-                </a:tc>
-                <a:extLst>
-                  <a:ext uri="{0D108BD9-81ED-4DB2-BD59-A6C34878D82A}">
-                    <a16:rowId xmlns:a16="http://schemas.microsoft.com/office/drawing/2014/main" val="277198827"/>
-                  </a:ext>
-                </a:extLst>
-              </a:tr>
-              <a:tr h="370840">
-                <a:tc>
-                  <a:txBody>
-                    <a:bodyPr/>
-                    <a:lstStyle/>
-                    <a:p>
-                      <a:endParaRPr lang="en-US"/>
-                    </a:p>
-                  </a:txBody>
-                  <a:tcPr/>
-                </a:tc>
-                <a:tc>
-                  <a:txBody>
-                    <a:bodyPr/>
-                    <a:lstStyle/>
-                    <a:p>
-                      <a:endParaRPr lang="en-US"/>
-                    </a:p>
-                  </a:txBody>
-                  <a:tcPr/>
-                </a:tc>
-                <a:tc>
-                  <a:txBody>
-                    <a:bodyPr/>
-                    <a:lstStyle/>
-                    <a:p>
-                      <a:endParaRPr lang="en-US"/>
-                    </a:p>
-                  </a:txBody>
-                  <a:tcPr/>
-                </a:tc>
-                <a:extLst>
-                  <a:ext uri="{0D108BD9-81ED-4DB2-BD59-A6C34878D82A}">
-                    <a16:rowId xmlns:a16="http://schemas.microsoft.com/office/drawing/2014/main" val="2659278934"/>
-                  </a:ext>
-                </a:extLst>
-              </a:tr>
-              <a:tr h="370840">
-                <a:tc>
-                  <a:txBody>
-                    <a:bodyPr/>
-                    <a:lstStyle/>
-                    <a:p>
-                      <a:endParaRPr lang="en-US"/>
-                    </a:p>
-                  </a:txBody>
-                  <a:tcPr/>
-                </a:tc>
-                <a:tc>
-                  <a:txBody>
-                    <a:bodyPr/>
-                    <a:lstStyle/>
-                    <a:p>
-                      <a:endParaRPr lang="en-US"/>
-                    </a:p>
-                  </a:txBody>
-                  <a:tcPr/>
-                </a:tc>
-                <a:tc>
-                  <a:txBody>
-                    <a:bodyPr/>
-                    <a:lstStyle/>
-                    <a:p>
-                      <a:endParaRPr lang="en-US"/>
-                    </a:p>
-                  </a:txBody>
-                  <a:tcPr/>
-                </a:tc>
-                <a:extLst>
-                  <a:ext uri="{0D108BD9-81ED-4DB2-BD59-A6C34878D82A}">
-                    <a16:rowId xmlns:a16="http://schemas.microsoft.com/office/drawing/2014/main" val="1681074731"/>
-                  </a:ext>
-                </a:extLst>
-              </a:tr>
-              <a:tr h="370840">
-                <a:tc>
-                  <a:txBody>
-                    <a:bodyPr/>
-                    <a:lstStyle/>
-                    <a:p>
-                      <a:endParaRPr lang="en-US"/>
-                    </a:p>
-                  </a:txBody>
-                  <a:tcPr/>
-                </a:tc>
-                <a:tc>
-                  <a:txBody>
-                    <a:bodyPr/>
-                    <a:lstStyle/>
-                    <a:p>
-                      <a:endParaRPr lang="en-US"/>
-                    </a:p>
-                  </a:txBody>
-                  <a:tcPr/>
-                </a:tc>
-                <a:tc>
-                  <a:txBody>
-                    <a:bodyPr/>
-                    <a:lstStyle/>
-                    <a:p>
-                      <a:endParaRPr lang="en-US"/>
-                    </a:p>
-                  </a:txBody>
-                  <a:tcPr/>
-                </a:tc>
-                <a:extLst>
-                  <a:ext uri="{0D108BD9-81ED-4DB2-BD59-A6C34878D82A}">
-                    <a16:rowId xmlns:a16="http://schemas.microsoft.com/office/drawing/2014/main" val="2554165240"/>
-                  </a:ext>
-                </a:extLst>
-              </a:tr>
-              <a:tr h="370840">
-                <a:tc>
-                  <a:txBody>
-                    <a:bodyPr/>
-                    <a:lstStyle/>
-                    <a:p>
-                      <a:endParaRPr lang="en-US"/>
-                    </a:p>
-                  </a:txBody>
-                  <a:tcPr/>
-                </a:tc>
-                <a:tc>
-                  <a:txBody>
-                    <a:bodyPr/>
-                    <a:lstStyle/>
-                    <a:p>
-                      <a:endParaRPr lang="en-US"/>
-                    </a:p>
-                  </a:txBody>
-                  <a:tcPr/>
-                </a:tc>
-                <a:tc>
-                  <a:txBody>
-                    <a:bodyPr/>
-                    <a:lstStyle/>
-                    <a:p>
-                      <a:endParaRPr lang="en-US"/>
-                    </a:p>
-                  </a:txBody>
-                  <a:tcPr/>
-                </a:tc>
-                <a:extLst>
-                  <a:ext uri="{0D108BD9-81ED-4DB2-BD59-A6C34878D82A}">
-                    <a16:rowId xmlns:a16="http://schemas.microsoft.com/office/drawing/2014/main" val="2308638167"/>
-                  </a:ext>
-                </a:extLst>
-              </a:tr>
-              <a:tr h="370840">
-                <a:tc>
-                  <a:txBody>
-                    <a:bodyPr/>
-                    <a:lstStyle/>
-                    <a:p>
-                      <a:endParaRPr lang="en-US"/>
-                    </a:p>
-                  </a:txBody>
-                  <a:tcPr/>
-                </a:tc>
-                <a:tc>
-                  <a:txBody>
-                    <a:bodyPr/>
-                    <a:lstStyle/>
-                    <a:p>
-                      <a:endParaRPr lang="en-US"/>
-                    </a:p>
-                  </a:txBody>
-                  <a:tcPr/>
-                </a:tc>
-                <a:tc>
-                  <a:txBody>
-                    <a:bodyPr/>
-                    <a:lstStyle/>
-                    <a:p>
-                      <a:endParaRPr lang="en-US"/>
-                    </a:p>
-                  </a:txBody>
-                  <a:tcPr/>
-                </a:tc>
-                <a:extLst>
-                  <a:ext uri="{0D108BD9-81ED-4DB2-BD59-A6C34878D82A}">
-                    <a16:rowId xmlns:a16="http://schemas.microsoft.com/office/drawing/2014/main" val="2378389319"/>
-                  </a:ext>
-                </a:extLst>
-              </a:tr>
-              <a:tr h="370840">
-                <a:tc>
-                  <a:txBody>
-                    <a:bodyPr/>
-                    <a:lstStyle/>
-                    <a:p>
-                      <a:endParaRPr lang="en-US"/>
-                    </a:p>
-                  </a:txBody>
-                  <a:tcPr/>
-                </a:tc>
-                <a:tc>
-                  <a:txBody>
-                    <a:bodyPr/>
-                    <a:lstStyle/>
-                    <a:p>
-                      <a:endParaRPr lang="en-US"/>
-                    </a:p>
-                  </a:txBody>
-                  <a:tcPr/>
-                </a:tc>
-                <a:tc>
-                  <a:txBody>
-                    <a:bodyPr/>
-                    <a:lstStyle/>
-                    <a:p>
-                      <a:endParaRPr lang="en-US" dirty="0"/>
-                    </a:p>
-                  </a:txBody>
-                  <a:tcPr/>
-                </a:tc>
-                <a:extLst>
-                  <a:ext uri="{0D108BD9-81ED-4DB2-BD59-A6C34878D82A}">
-                    <a16:rowId xmlns:a16="http://schemas.microsoft.com/office/drawing/2014/main" val="1792756806"/>
-                  </a:ext>
-                </a:extLst>
-              </a:tr>
-            </a:tbl>
-          </a:graphicData>
-        </a:graphic>
-      </p:graphicFrame>
+          <a:lstStyle>
+            <a:lvl1pPr marL="0" indent="0" algn="ctr" defTabSz="914400" rtl="0" eaLnBrk="1" latinLnBrk="0" hangingPunct="1">
+              <a:lnSpc>
+                <a:spcPct val="90000"/>
+              </a:lnSpc>
+              <a:spcBef>
+                <a:spcPts val="1000"/>
+              </a:spcBef>
+              <a:buFont typeface="Arial" panose="020B0604020202020204" pitchFamily="34" charset="0"/>
+              <a:buNone/>
+              <a:defRPr sz="2400" kern="1200">
+                <a:solidFill>
+                  <a:schemeClr val="tx1"/>
+                </a:solidFill>
+                <a:latin typeface="+mn-lt"/>
+                <a:ea typeface="+mn-ea"/>
+                <a:cs typeface="+mn-cs"/>
+              </a:defRPr>
+            </a:lvl1pPr>
+            <a:lvl2pPr marL="457200" indent="0" algn="ctr" defTabSz="914400" rtl="0" eaLnBrk="1" latinLnBrk="0" hangingPunct="1">
+              <a:lnSpc>
+                <a:spcPct val="90000"/>
+              </a:lnSpc>
+              <a:spcBef>
+                <a:spcPts val="500"/>
+              </a:spcBef>
+              <a:buFont typeface="Arial" panose="020B0604020202020204" pitchFamily="34" charset="0"/>
+              <a:buNone/>
+              <a:defRPr sz="2000" kern="1200">
+                <a:solidFill>
+                  <a:schemeClr val="tx1"/>
+                </a:solidFill>
+                <a:latin typeface="+mn-lt"/>
+                <a:ea typeface="+mn-ea"/>
+                <a:cs typeface="+mn-cs"/>
+              </a:defRPr>
+            </a:lvl2pPr>
+            <a:lvl3pPr marL="914400" indent="0" algn="ctr" defTabSz="914400" rtl="0" eaLnBrk="1" latinLnBrk="0" hangingPunct="1">
+              <a:lnSpc>
+                <a:spcPct val="90000"/>
+              </a:lnSpc>
+              <a:spcBef>
+                <a:spcPts val="500"/>
+              </a:spcBef>
+              <a:buFont typeface="Arial" panose="020B0604020202020204" pitchFamily="34" charset="0"/>
+              <a:buNone/>
+              <a:defRPr sz="1800" kern="1200">
+                <a:solidFill>
+                  <a:schemeClr val="tx1"/>
+                </a:solidFill>
+                <a:latin typeface="+mn-lt"/>
+                <a:ea typeface="+mn-ea"/>
+                <a:cs typeface="+mn-cs"/>
+              </a:defRPr>
+            </a:lvl3pPr>
+            <a:lvl4pPr marL="1371600" indent="0" algn="ctr" defTabSz="914400" rtl="0" eaLnBrk="1" latinLnBrk="0" hangingPunct="1">
+              <a:lnSpc>
+                <a:spcPct val="90000"/>
+              </a:lnSpc>
+              <a:spcBef>
+                <a:spcPts val="500"/>
+              </a:spcBef>
+              <a:buFont typeface="Arial" panose="020B0604020202020204" pitchFamily="34" charset="0"/>
+              <a:buNone/>
+              <a:defRPr sz="1600" kern="1200">
+                <a:solidFill>
+                  <a:schemeClr val="tx1"/>
+                </a:solidFill>
+                <a:latin typeface="+mn-lt"/>
+                <a:ea typeface="+mn-ea"/>
+                <a:cs typeface="+mn-cs"/>
+              </a:defRPr>
+            </a:lvl4pPr>
+            <a:lvl5pPr marL="1828800" indent="0" algn="ctr" defTabSz="914400" rtl="0" eaLnBrk="1" latinLnBrk="0" hangingPunct="1">
+              <a:lnSpc>
+                <a:spcPct val="90000"/>
+              </a:lnSpc>
+              <a:spcBef>
+                <a:spcPts val="500"/>
+              </a:spcBef>
+              <a:buFont typeface="Arial" panose="020B0604020202020204" pitchFamily="34" charset="0"/>
+              <a:buNone/>
+              <a:defRPr sz="1600" kern="1200">
+                <a:solidFill>
+                  <a:schemeClr val="tx1"/>
+                </a:solidFill>
+                <a:latin typeface="+mn-lt"/>
+                <a:ea typeface="+mn-ea"/>
+                <a:cs typeface="+mn-cs"/>
+              </a:defRPr>
+            </a:lvl5pPr>
+            <a:lvl6pPr marL="2286000" indent="0" algn="ctr" defTabSz="914400" rtl="0" eaLnBrk="1" latinLnBrk="0" hangingPunct="1">
+              <a:lnSpc>
+                <a:spcPct val="90000"/>
+              </a:lnSpc>
+              <a:spcBef>
+                <a:spcPts val="500"/>
+              </a:spcBef>
+              <a:buFont typeface="Arial" panose="020B0604020202020204" pitchFamily="34" charset="0"/>
+              <a:buNone/>
+              <a:defRPr sz="1600" kern="1200">
+                <a:solidFill>
+                  <a:schemeClr val="tx1"/>
+                </a:solidFill>
+                <a:latin typeface="+mn-lt"/>
+                <a:ea typeface="+mn-ea"/>
+                <a:cs typeface="+mn-cs"/>
+              </a:defRPr>
+            </a:lvl6pPr>
+            <a:lvl7pPr marL="2743200" indent="0" algn="ctr" defTabSz="914400" rtl="0" eaLnBrk="1" latinLnBrk="0" hangingPunct="1">
+              <a:lnSpc>
+                <a:spcPct val="90000"/>
+              </a:lnSpc>
+              <a:spcBef>
+                <a:spcPts val="500"/>
+              </a:spcBef>
+              <a:buFont typeface="Arial" panose="020B0604020202020204" pitchFamily="34" charset="0"/>
+              <a:buNone/>
+              <a:defRPr sz="1600" kern="1200">
+                <a:solidFill>
+                  <a:schemeClr val="tx1"/>
+                </a:solidFill>
+                <a:latin typeface="+mn-lt"/>
+                <a:ea typeface="+mn-ea"/>
+                <a:cs typeface="+mn-cs"/>
+              </a:defRPr>
+            </a:lvl7pPr>
+            <a:lvl8pPr marL="3200400" indent="0" algn="ctr" defTabSz="914400" rtl="0" eaLnBrk="1" latinLnBrk="0" hangingPunct="1">
+              <a:lnSpc>
+                <a:spcPct val="90000"/>
+              </a:lnSpc>
+              <a:spcBef>
+                <a:spcPts val="500"/>
+              </a:spcBef>
+              <a:buFont typeface="Arial" panose="020B0604020202020204" pitchFamily="34" charset="0"/>
+              <a:buNone/>
+              <a:defRPr sz="1600" kern="1200">
+                <a:solidFill>
+                  <a:schemeClr val="tx1"/>
+                </a:solidFill>
+                <a:latin typeface="+mn-lt"/>
+                <a:ea typeface="+mn-ea"/>
+                <a:cs typeface="+mn-cs"/>
+              </a:defRPr>
+            </a:lvl8pPr>
+            <a:lvl9pPr marL="3657600" indent="0" algn="ctr" defTabSz="914400" rtl="0" eaLnBrk="1" latinLnBrk="0" hangingPunct="1">
+              <a:lnSpc>
+                <a:spcPct val="90000"/>
+              </a:lnSpc>
+              <a:spcBef>
+                <a:spcPts val="500"/>
+              </a:spcBef>
+              <a:buFont typeface="Arial" panose="020B0604020202020204" pitchFamily="34" charset="0"/>
+              <a:buNone/>
+              <a:defRPr sz="1600" kern="1200">
+                <a:solidFill>
+                  <a:schemeClr val="tx1"/>
+                </a:solidFill>
+                <a:latin typeface="+mn-lt"/>
+                <a:ea typeface="+mn-ea"/>
+                <a:cs typeface="+mn-cs"/>
+              </a:defRPr>
+            </a:lvl9pPr>
+          </a:lstStyle>
+          <a:p>
+            <a:r>
+              <a:rPr lang="en-US" sz="3600" dirty="0"/>
+              <a:t>Innovation claim is To teach complex programming concepts to teens (13-18 year old) in a fun and engaging way in order to achieve greater retention of the concepts.</a:t>
+            </a:r>
+          </a:p>
+          <a:p>
+            <a:endParaRPr lang="en-US" sz="3600" dirty="0"/>
+          </a:p>
+        </p:txBody>
+      </p:sp>
     </p:spTree>
   </p:cSld>
   <p:clrMapOvr>
@@ -6309,119 +7002,393 @@
           </a:p>
         </p:txBody>
       </p:sp>
-      <p:pic>
-        <p:nvPicPr>
-          <p:cNvPr id="1026" name="Picture 2"/>
-          <p:cNvPicPr>
-            <a:picLocks noChangeAspect="1" noChangeArrowheads="1"/>
-          </p:cNvPicPr>
-          <p:nvPr/>
-        </p:nvPicPr>
-        <p:blipFill>
-          <a:blip r:embed="rId3" cstate="print">
+      <p:sp>
+        <p:nvSpPr>
+          <p:cNvPr id="9" name="Rectangle 8">
             <a:extLst>
-              <a:ext uri="{28A0092B-C50C-407E-A947-70E740481C1C}">
-                <a14:useLocalDpi xmlns:a14="http://schemas.microsoft.com/office/drawing/2010/main" val="0"/>
+              <a:ext uri="{FF2B5EF4-FFF2-40B4-BE49-F238E27FC236}">
+                <a16:creationId xmlns:a16="http://schemas.microsoft.com/office/drawing/2014/main" id="{AB9E11C4-D162-4905-8CEA-8AB93360DA98}"/>
               </a:ext>
             </a:extLst>
-          </a:blip>
-          <a:srcRect/>
-          <a:stretch>
-            <a:fillRect/>
-          </a:stretch>
-        </p:blipFill>
-        <p:spPr bwMode="auto">
-          <a:xfrm rot="16200000">
-            <a:off x="5642392" y="1086858"/>
-            <a:ext cx="3827520" cy="2870640"/>
+          </p:cNvPr>
+          <p:cNvSpPr/>
+          <p:nvPr/>
+        </p:nvSpPr>
+        <p:spPr>
+          <a:xfrm>
+            <a:off x="3174437" y="428504"/>
+            <a:ext cx="9144000" cy="646331"/>
           </a:xfrm>
           <a:prstGeom prst="rect">
             <a:avLst/>
           </a:prstGeom>
-          <a:noFill/>
-          <a:extLst>
-            <a:ext uri="{909E8E84-426E-40DD-AFC4-6F175D3DCCD1}">
-              <a14:hiddenFill xmlns:a14="http://schemas.microsoft.com/office/drawing/2010/main">
-                <a:solidFill>
-                  <a:srgbClr val="FFFFFF"/>
-                </a:solidFill>
-              </a14:hiddenFill>
-            </a:ext>
-          </a:extLst>
         </p:spPr>
-      </p:pic>
-      <p:pic>
-        <p:nvPicPr>
-          <p:cNvPr id="1028" name="Picture 4"/>
-          <p:cNvPicPr>
-            <a:picLocks noChangeAspect="1" noChangeArrowheads="1"/>
-          </p:cNvPicPr>
-          <p:nvPr/>
-        </p:nvPicPr>
-        <p:blipFill>
-          <a:blip r:embed="rId4" cstate="print">
+        <p:txBody>
+          <a:bodyPr wrap="square">
+            <a:spAutoFit/>
+          </a:bodyPr>
+          <a:lstStyle/>
+          <a:p>
+            <a:r>
+              <a:rPr lang="en-US" sz="3600" dirty="0">
+                <a:latin typeface="Century Gothic" panose="020B0502020202020204" pitchFamily="34" charset="0"/>
+              </a:rPr>
+              <a:t>Arrays and Linked List</a:t>
+            </a:r>
+          </a:p>
+        </p:txBody>
+      </p:sp>
+      <p:graphicFrame>
+        <p:nvGraphicFramePr>
+          <p:cNvPr id="4" name="Table 4">
             <a:extLst>
-              <a:ext uri="{28A0092B-C50C-407E-A947-70E740481C1C}">
-                <a14:useLocalDpi xmlns:a14="http://schemas.microsoft.com/office/drawing/2010/main" val="0"/>
+              <a:ext uri="{FF2B5EF4-FFF2-40B4-BE49-F238E27FC236}">
+                <a16:creationId xmlns:a16="http://schemas.microsoft.com/office/drawing/2014/main" id="{C265CD27-1F81-4CE1-9608-F4B2428CDA58}"/>
               </a:ext>
             </a:extLst>
-          </a:blip>
-          <a:srcRect/>
-          <a:stretch>
-            <a:fillRect/>
-          </a:stretch>
-        </p:blipFill>
-        <p:spPr bwMode="auto">
-          <a:xfrm rot="16200000">
-            <a:off x="1379723" y="1048694"/>
-            <a:ext cx="3867824" cy="2899614"/>
+          </p:cNvPr>
+          <p:cNvGraphicFramePr>
+            <a:graphicFrameLocks noGrp="1"/>
+          </p:cNvGraphicFramePr>
+          <p:nvPr>
+            <p:extLst>
+              <p:ext uri="{D42A27DB-BD31-4B8C-83A1-F6EECF244321}">
+                <p14:modId xmlns:p14="http://schemas.microsoft.com/office/powerpoint/2010/main" val="1741376788"/>
+              </p:ext>
+            </p:extLst>
+          </p:nvPr>
+        </p:nvGraphicFramePr>
+        <p:xfrm>
+          <a:off x="1785074" y="1987159"/>
+          <a:ext cx="8128000" cy="4323080"/>
+        </p:xfrm>
+        <a:graphic>
+          <a:graphicData uri="http://schemas.openxmlformats.org/drawingml/2006/table">
+            <a:tbl>
+              <a:tblPr firstRow="1" bandRow="1">
+                <a:tableStyleId>{5C22544A-7EE6-4342-B048-85BDC9FD1C3A}</a:tableStyleId>
+              </a:tblPr>
+              <a:tblGrid>
+                <a:gridCol w="4064000">
+                  <a:extLst>
+                    <a:ext uri="{9D8B030D-6E8A-4147-A177-3AD203B41FA5}">
+                      <a16:colId xmlns:a16="http://schemas.microsoft.com/office/drawing/2014/main" val="341093875"/>
+                    </a:ext>
+                  </a:extLst>
+                </a:gridCol>
+                <a:gridCol w="4064000">
+                  <a:extLst>
+                    <a:ext uri="{9D8B030D-6E8A-4147-A177-3AD203B41FA5}">
+                      <a16:colId xmlns:a16="http://schemas.microsoft.com/office/drawing/2014/main" val="3727544041"/>
+                    </a:ext>
+                  </a:extLst>
+                </a:gridCol>
+              </a:tblGrid>
+              <a:tr h="370840">
+                <a:tc>
+                  <a:txBody>
+                    <a:bodyPr/>
+                    <a:lstStyle/>
+                    <a:p>
+                      <a:r>
+                        <a:rPr lang="en-US" dirty="0"/>
+                        <a:t>Array</a:t>
+                      </a:r>
+                    </a:p>
+                  </a:txBody>
+                  <a:tcPr/>
+                </a:tc>
+                <a:tc>
+                  <a:txBody>
+                    <a:bodyPr/>
+                    <a:lstStyle/>
+                    <a:p>
+                      <a:r>
+                        <a:rPr lang="en-US" dirty="0"/>
+                        <a:t>Linked List</a:t>
+                      </a:r>
+                    </a:p>
+                  </a:txBody>
+                  <a:tcPr/>
+                </a:tc>
+                <a:extLst>
+                  <a:ext uri="{0D108BD9-81ED-4DB2-BD59-A6C34878D82A}">
+                    <a16:rowId xmlns:a16="http://schemas.microsoft.com/office/drawing/2014/main" val="2593068809"/>
+                  </a:ext>
+                </a:extLst>
+              </a:tr>
+              <a:tr h="370840">
+                <a:tc>
+                  <a:txBody>
+                    <a:bodyPr/>
+                    <a:lstStyle/>
+                    <a:p>
+                      <a:r>
+                        <a:rPr lang="en-US" dirty="0"/>
+                        <a:t>Fixed Size meaning it’s static as each rooms is next to each other</a:t>
+                      </a:r>
+                    </a:p>
+                  </a:txBody>
+                  <a:tcPr/>
+                </a:tc>
+                <a:tc>
+                  <a:txBody>
+                    <a:bodyPr/>
+                    <a:lstStyle/>
+                    <a:p>
+                      <a:r>
+                        <a:rPr lang="en-US" dirty="0"/>
+                        <a:t>Dynamic Size as it allows to allocate more memory. Meaning you can access newer rooms that Arrays don’t in game</a:t>
+                      </a:r>
+                    </a:p>
+                  </a:txBody>
+                  <a:tcPr/>
+                </a:tc>
+                <a:extLst>
+                  <a:ext uri="{0D108BD9-81ED-4DB2-BD59-A6C34878D82A}">
+                    <a16:rowId xmlns:a16="http://schemas.microsoft.com/office/drawing/2014/main" val="1933068448"/>
+                  </a:ext>
+                </a:extLst>
+              </a:tr>
+              <a:tr h="370840">
+                <a:tc>
+                  <a:txBody>
+                    <a:bodyPr/>
+                    <a:lstStyle/>
+                    <a:p>
+                      <a:r>
+                        <a:rPr lang="en-US" dirty="0"/>
+                        <a:t>Easier to access</a:t>
+                      </a:r>
+                    </a:p>
+                  </a:txBody>
+                  <a:tcPr/>
+                </a:tc>
+                <a:tc>
+                  <a:txBody>
+                    <a:bodyPr/>
+                    <a:lstStyle/>
+                    <a:p>
+                      <a:r>
+                        <a:rPr lang="en-US" dirty="0"/>
+                        <a:t>More ease of insertion and deletion</a:t>
+                      </a:r>
+                    </a:p>
+                  </a:txBody>
+                  <a:tcPr/>
+                </a:tc>
+                <a:extLst>
+                  <a:ext uri="{0D108BD9-81ED-4DB2-BD59-A6C34878D82A}">
+                    <a16:rowId xmlns:a16="http://schemas.microsoft.com/office/drawing/2014/main" val="3207949262"/>
+                  </a:ext>
+                </a:extLst>
+              </a:tr>
+              <a:tr h="370840">
+                <a:tc>
+                  <a:txBody>
+                    <a:bodyPr/>
+                    <a:lstStyle/>
+                    <a:p>
+                      <a:r>
+                        <a:rPr lang="en-US" dirty="0"/>
+                        <a:t>Contagious memory location.</a:t>
+                      </a:r>
+                    </a:p>
+                  </a:txBody>
+                  <a:tcPr/>
+                </a:tc>
+                <a:tc>
+                  <a:txBody>
+                    <a:bodyPr/>
+                    <a:lstStyle/>
+                    <a:p>
+                      <a:r>
+                        <a:rPr lang="en-US" dirty="0"/>
+                        <a:t>Complex to access, imagine of doing ideas back and forth.</a:t>
+                      </a:r>
+                    </a:p>
+                  </a:txBody>
+                  <a:tcPr/>
+                </a:tc>
+                <a:extLst>
+                  <a:ext uri="{0D108BD9-81ED-4DB2-BD59-A6C34878D82A}">
+                    <a16:rowId xmlns:a16="http://schemas.microsoft.com/office/drawing/2014/main" val="523616427"/>
+                  </a:ext>
+                </a:extLst>
+              </a:tr>
+              <a:tr h="370840">
+                <a:tc>
+                  <a:txBody>
+                    <a:bodyPr/>
+                    <a:lstStyle/>
+                    <a:p>
+                      <a:r>
+                        <a:rPr lang="en-US" dirty="0"/>
+                        <a:t>Access is easier which you can see pathways</a:t>
+                      </a:r>
+                    </a:p>
+                  </a:txBody>
+                  <a:tcPr/>
+                </a:tc>
+                <a:tc>
+                  <a:txBody>
+                    <a:bodyPr/>
+                    <a:lstStyle/>
+                    <a:p>
+                      <a:pPr marL="0" marR="0" lvl="0" indent="0" algn="l" defTabSz="914400" rtl="0" eaLnBrk="1" fontAlgn="auto" latinLnBrk="0" hangingPunct="1">
+                        <a:lnSpc>
+                          <a:spcPct val="100000"/>
+                        </a:lnSpc>
+                        <a:spcBef>
+                          <a:spcPts val="0"/>
+                        </a:spcBef>
+                        <a:spcAft>
+                          <a:spcPts val="0"/>
+                        </a:spcAft>
+                        <a:buClrTx/>
+                        <a:buSzTx/>
+                        <a:buFontTx/>
+                        <a:buNone/>
+                        <a:tabLst/>
+                        <a:defRPr/>
+                      </a:pPr>
+                      <a:r>
+                        <a:rPr lang="en-US" dirty="0"/>
+                        <a:t>Requires Pointers that are display as teleporters thus all doors are closed</a:t>
+                      </a:r>
+                    </a:p>
+                    <a:p>
+                      <a:r>
+                        <a:rPr lang="en-US" dirty="0"/>
+                        <a:t>(key feature)</a:t>
+                      </a:r>
+                    </a:p>
+                  </a:txBody>
+                  <a:tcPr/>
+                </a:tc>
+                <a:extLst>
+                  <a:ext uri="{0D108BD9-81ED-4DB2-BD59-A6C34878D82A}">
+                    <a16:rowId xmlns:a16="http://schemas.microsoft.com/office/drawing/2014/main" val="1667901652"/>
+                  </a:ext>
+                </a:extLst>
+              </a:tr>
+              <a:tr h="370840">
+                <a:tc>
+                  <a:txBody>
+                    <a:bodyPr/>
+                    <a:lstStyle/>
+                    <a:p>
+                      <a:endParaRPr lang="en-US" dirty="0"/>
+                    </a:p>
+                  </a:txBody>
+                  <a:tcPr/>
+                </a:tc>
+                <a:tc>
+                  <a:txBody>
+                    <a:bodyPr/>
+                    <a:lstStyle/>
+                    <a:p>
+                      <a:endParaRPr lang="en-US" dirty="0"/>
+                    </a:p>
+                  </a:txBody>
+                  <a:tcPr/>
+                </a:tc>
+                <a:extLst>
+                  <a:ext uri="{0D108BD9-81ED-4DB2-BD59-A6C34878D82A}">
+                    <a16:rowId xmlns:a16="http://schemas.microsoft.com/office/drawing/2014/main" val="3982769589"/>
+                  </a:ext>
+                </a:extLst>
+              </a:tr>
+              <a:tr h="370840">
+                <a:tc>
+                  <a:txBody>
+                    <a:bodyPr/>
+                    <a:lstStyle/>
+                    <a:p>
+                      <a:endParaRPr lang="en-US"/>
+                    </a:p>
+                  </a:txBody>
+                  <a:tcPr/>
+                </a:tc>
+                <a:tc>
+                  <a:txBody>
+                    <a:bodyPr/>
+                    <a:lstStyle/>
+                    <a:p>
+                      <a:endParaRPr lang="en-US"/>
+                    </a:p>
+                  </a:txBody>
+                  <a:tcPr/>
+                </a:tc>
+                <a:extLst>
+                  <a:ext uri="{0D108BD9-81ED-4DB2-BD59-A6C34878D82A}">
+                    <a16:rowId xmlns:a16="http://schemas.microsoft.com/office/drawing/2014/main" val="2691977355"/>
+                  </a:ext>
+                </a:extLst>
+              </a:tr>
+              <a:tr h="370840">
+                <a:tc>
+                  <a:txBody>
+                    <a:bodyPr/>
+                    <a:lstStyle/>
+                    <a:p>
+                      <a:endParaRPr lang="en-US" dirty="0"/>
+                    </a:p>
+                  </a:txBody>
+                  <a:tcPr/>
+                </a:tc>
+                <a:tc>
+                  <a:txBody>
+                    <a:bodyPr/>
+                    <a:lstStyle/>
+                    <a:p>
+                      <a:endParaRPr lang="en-US" dirty="0"/>
+                    </a:p>
+                  </a:txBody>
+                  <a:tcPr/>
+                </a:tc>
+                <a:extLst>
+                  <a:ext uri="{0D108BD9-81ED-4DB2-BD59-A6C34878D82A}">
+                    <a16:rowId xmlns:a16="http://schemas.microsoft.com/office/drawing/2014/main" val="4011679703"/>
+                  </a:ext>
+                </a:extLst>
+              </a:tr>
+            </a:tbl>
+          </a:graphicData>
+        </a:graphic>
+      </p:graphicFrame>
+      <p:sp>
+        <p:nvSpPr>
+          <p:cNvPr id="10" name="Rectangle 9">
+            <a:extLst>
+              <a:ext uri="{FF2B5EF4-FFF2-40B4-BE49-F238E27FC236}">
+                <a16:creationId xmlns:a16="http://schemas.microsoft.com/office/drawing/2014/main" id="{65DE1988-5A65-4989-BA25-0D58ED153A14}"/>
+              </a:ext>
+            </a:extLst>
+          </p:cNvPr>
+          <p:cNvSpPr/>
+          <p:nvPr/>
+        </p:nvSpPr>
+        <p:spPr>
+          <a:xfrm>
+            <a:off x="3233847" y="1159631"/>
+            <a:ext cx="9144000" cy="400110"/>
           </a:xfrm>
           <a:prstGeom prst="rect">
             <a:avLst/>
           </a:prstGeom>
-          <a:noFill/>
-          <a:extLst>
-            <a:ext uri="{909E8E84-426E-40DD-AFC4-6F175D3DCCD1}">
-              <a14:hiddenFill xmlns:a14="http://schemas.microsoft.com/office/drawing/2010/main">
-                <a:solidFill>
-                  <a:srgbClr val="FFFFFF"/>
-                </a:solidFill>
-              </a14:hiddenFill>
-            </a:ext>
-          </a:extLst>
         </p:spPr>
-      </p:pic>
-      <p:sp>
-        <p:nvSpPr>
-          <p:cNvPr id="3" name="TextBox 2"/>
-          <p:cNvSpPr txBox="1"/>
-          <p:nvPr/>
-        </p:nvSpPr>
-        <p:spPr>
-          <a:xfrm>
-            <a:off x="1470025" y="4636394"/>
-            <a:ext cx="8824488" cy="923330"/>
-          </a:xfrm>
-          <a:prstGeom prst="rect">
-            <a:avLst/>
-          </a:prstGeom>
-          <a:noFill/>
-        </p:spPr>
-        <p:txBody>
-          <a:bodyPr wrap="square" rtlCol="0">
+        <p:txBody>
+          <a:bodyPr wrap="square">
             <a:spAutoFit/>
           </a:bodyPr>
           <a:lstStyle/>
           <a:p>
             <a:r>
-              <a:rPr lang="en-US" dirty="0"/>
-              <a:t>-Game Design Document that includes a storyboard for each scenario for Array and Linked List.</a:t>
-            </a:r>
-          </a:p>
-          <a:p>
-            <a:r>
-              <a:rPr lang="en-US" dirty="0"/>
-              <a:t>-Each storyboard has a different scenario of how an Array works and Linked List work.</a:t>
+              <a:rPr lang="en-US" sz="2000" dirty="0">
+                <a:latin typeface="Century Gothic" panose="020B0502020202020204" pitchFamily="34" charset="0"/>
+              </a:rPr>
+              <a:t>Why using Arrays and Linked List?</a:t>
             </a:r>
           </a:p>
         </p:txBody>
@@ -6483,6 +7450,411 @@
       </p:pic>
       <p:sp>
         <p:nvSpPr>
+          <p:cNvPr id="2" name="Rectangle: Rounded Corners 1"/>
+          <p:cNvSpPr/>
+          <p:nvPr/>
+        </p:nvSpPr>
+        <p:spPr>
+          <a:xfrm>
+            <a:off x="506437" y="407962"/>
+            <a:ext cx="11071274" cy="6063175"/>
+          </a:xfrm>
+          <a:prstGeom prst="roundRect">
+            <a:avLst/>
+          </a:prstGeom>
+          <a:noFill/>
+        </p:spPr>
+        <p:style>
+          <a:lnRef idx="2">
+            <a:schemeClr val="accent1">
+              <a:shade val="50000"/>
+            </a:schemeClr>
+          </a:lnRef>
+          <a:fillRef idx="1">
+            <a:schemeClr val="accent1"/>
+          </a:fillRef>
+          <a:effectRef idx="0">
+            <a:schemeClr val="accent1"/>
+          </a:effectRef>
+          <a:fontRef idx="minor">
+            <a:schemeClr val="lt1"/>
+          </a:fontRef>
+        </p:style>
+        <p:txBody>
+          <a:bodyPr rtlCol="0" anchor="ctr"/>
+          <a:lstStyle/>
+          <a:p>
+            <a:pPr algn="ctr"/>
+            <a:endParaRPr lang="en-US"/>
+          </a:p>
+        </p:txBody>
+      </p:sp>
+      <p:sp>
+        <p:nvSpPr>
+          <p:cNvPr id="8" name="Subtitle 2"/>
+          <p:cNvSpPr txBox="1"/>
+          <p:nvPr/>
+        </p:nvSpPr>
+        <p:spPr>
+          <a:xfrm>
+            <a:off x="1470025" y="5111115"/>
+            <a:ext cx="9144000" cy="1292225"/>
+          </a:xfrm>
+          <a:prstGeom prst="rect">
+            <a:avLst/>
+          </a:prstGeom>
+        </p:spPr>
+        <p:txBody>
+          <a:bodyPr vert="horz" lIns="91440" tIns="45720" rIns="91440" bIns="45720" rtlCol="0">
+            <a:normAutofit/>
+          </a:bodyPr>
+          <a:lstStyle>
+            <a:lvl1pPr marL="0" indent="0" algn="ctr" defTabSz="914400" rtl="0" eaLnBrk="1" latinLnBrk="0" hangingPunct="1">
+              <a:lnSpc>
+                <a:spcPct val="90000"/>
+              </a:lnSpc>
+              <a:spcBef>
+                <a:spcPts val="1000"/>
+              </a:spcBef>
+              <a:buFont typeface="Arial" panose="020B0604020202020204" pitchFamily="34" charset="0"/>
+              <a:buNone/>
+              <a:defRPr sz="2400" kern="1200">
+                <a:solidFill>
+                  <a:schemeClr val="tx1"/>
+                </a:solidFill>
+                <a:latin typeface="+mn-lt"/>
+                <a:ea typeface="+mn-ea"/>
+                <a:cs typeface="+mn-cs"/>
+              </a:defRPr>
+            </a:lvl1pPr>
+            <a:lvl2pPr marL="457200" indent="0" algn="ctr" defTabSz="914400" rtl="0" eaLnBrk="1" latinLnBrk="0" hangingPunct="1">
+              <a:lnSpc>
+                <a:spcPct val="90000"/>
+              </a:lnSpc>
+              <a:spcBef>
+                <a:spcPts val="500"/>
+              </a:spcBef>
+              <a:buFont typeface="Arial" panose="020B0604020202020204" pitchFamily="34" charset="0"/>
+              <a:buNone/>
+              <a:defRPr sz="2000" kern="1200">
+                <a:solidFill>
+                  <a:schemeClr val="tx1"/>
+                </a:solidFill>
+                <a:latin typeface="+mn-lt"/>
+                <a:ea typeface="+mn-ea"/>
+                <a:cs typeface="+mn-cs"/>
+              </a:defRPr>
+            </a:lvl2pPr>
+            <a:lvl3pPr marL="914400" indent="0" algn="ctr" defTabSz="914400" rtl="0" eaLnBrk="1" latinLnBrk="0" hangingPunct="1">
+              <a:lnSpc>
+                <a:spcPct val="90000"/>
+              </a:lnSpc>
+              <a:spcBef>
+                <a:spcPts val="500"/>
+              </a:spcBef>
+              <a:buFont typeface="Arial" panose="020B0604020202020204" pitchFamily="34" charset="0"/>
+              <a:buNone/>
+              <a:defRPr sz="1800" kern="1200">
+                <a:solidFill>
+                  <a:schemeClr val="tx1"/>
+                </a:solidFill>
+                <a:latin typeface="+mn-lt"/>
+                <a:ea typeface="+mn-ea"/>
+                <a:cs typeface="+mn-cs"/>
+              </a:defRPr>
+            </a:lvl3pPr>
+            <a:lvl4pPr marL="1371600" indent="0" algn="ctr" defTabSz="914400" rtl="0" eaLnBrk="1" latinLnBrk="0" hangingPunct="1">
+              <a:lnSpc>
+                <a:spcPct val="90000"/>
+              </a:lnSpc>
+              <a:spcBef>
+                <a:spcPts val="500"/>
+              </a:spcBef>
+              <a:buFont typeface="Arial" panose="020B0604020202020204" pitchFamily="34" charset="0"/>
+              <a:buNone/>
+              <a:defRPr sz="1600" kern="1200">
+                <a:solidFill>
+                  <a:schemeClr val="tx1"/>
+                </a:solidFill>
+                <a:latin typeface="+mn-lt"/>
+                <a:ea typeface="+mn-ea"/>
+                <a:cs typeface="+mn-cs"/>
+              </a:defRPr>
+            </a:lvl4pPr>
+            <a:lvl5pPr marL="1828800" indent="0" algn="ctr" defTabSz="914400" rtl="0" eaLnBrk="1" latinLnBrk="0" hangingPunct="1">
+              <a:lnSpc>
+                <a:spcPct val="90000"/>
+              </a:lnSpc>
+              <a:spcBef>
+                <a:spcPts val="500"/>
+              </a:spcBef>
+              <a:buFont typeface="Arial" panose="020B0604020202020204" pitchFamily="34" charset="0"/>
+              <a:buNone/>
+              <a:defRPr sz="1600" kern="1200">
+                <a:solidFill>
+                  <a:schemeClr val="tx1"/>
+                </a:solidFill>
+                <a:latin typeface="+mn-lt"/>
+                <a:ea typeface="+mn-ea"/>
+                <a:cs typeface="+mn-cs"/>
+              </a:defRPr>
+            </a:lvl5pPr>
+            <a:lvl6pPr marL="2286000" indent="0" algn="ctr" defTabSz="914400" rtl="0" eaLnBrk="1" latinLnBrk="0" hangingPunct="1">
+              <a:lnSpc>
+                <a:spcPct val="90000"/>
+              </a:lnSpc>
+              <a:spcBef>
+                <a:spcPts val="500"/>
+              </a:spcBef>
+              <a:buFont typeface="Arial" panose="020B0604020202020204" pitchFamily="34" charset="0"/>
+              <a:buNone/>
+              <a:defRPr sz="1600" kern="1200">
+                <a:solidFill>
+                  <a:schemeClr val="tx1"/>
+                </a:solidFill>
+                <a:latin typeface="+mn-lt"/>
+                <a:ea typeface="+mn-ea"/>
+                <a:cs typeface="+mn-cs"/>
+              </a:defRPr>
+            </a:lvl6pPr>
+            <a:lvl7pPr marL="2743200" indent="0" algn="ctr" defTabSz="914400" rtl="0" eaLnBrk="1" latinLnBrk="0" hangingPunct="1">
+              <a:lnSpc>
+                <a:spcPct val="90000"/>
+              </a:lnSpc>
+              <a:spcBef>
+                <a:spcPts val="500"/>
+              </a:spcBef>
+              <a:buFont typeface="Arial" panose="020B0604020202020204" pitchFamily="34" charset="0"/>
+              <a:buNone/>
+              <a:defRPr sz="1600" kern="1200">
+                <a:solidFill>
+                  <a:schemeClr val="tx1"/>
+                </a:solidFill>
+                <a:latin typeface="+mn-lt"/>
+                <a:ea typeface="+mn-ea"/>
+                <a:cs typeface="+mn-cs"/>
+              </a:defRPr>
+            </a:lvl7pPr>
+            <a:lvl8pPr marL="3200400" indent="0" algn="ctr" defTabSz="914400" rtl="0" eaLnBrk="1" latinLnBrk="0" hangingPunct="1">
+              <a:lnSpc>
+                <a:spcPct val="90000"/>
+              </a:lnSpc>
+              <a:spcBef>
+                <a:spcPts val="500"/>
+              </a:spcBef>
+              <a:buFont typeface="Arial" panose="020B0604020202020204" pitchFamily="34" charset="0"/>
+              <a:buNone/>
+              <a:defRPr sz="1600" kern="1200">
+                <a:solidFill>
+                  <a:schemeClr val="tx1"/>
+                </a:solidFill>
+                <a:latin typeface="+mn-lt"/>
+                <a:ea typeface="+mn-ea"/>
+                <a:cs typeface="+mn-cs"/>
+              </a:defRPr>
+            </a:lvl8pPr>
+            <a:lvl9pPr marL="3657600" indent="0" algn="ctr" defTabSz="914400" rtl="0" eaLnBrk="1" latinLnBrk="0" hangingPunct="1">
+              <a:lnSpc>
+                <a:spcPct val="90000"/>
+              </a:lnSpc>
+              <a:spcBef>
+                <a:spcPts val="500"/>
+              </a:spcBef>
+              <a:buFont typeface="Arial" panose="020B0604020202020204" pitchFamily="34" charset="0"/>
+              <a:buNone/>
+              <a:defRPr sz="1600" kern="1200">
+                <a:solidFill>
+                  <a:schemeClr val="tx1"/>
+                </a:solidFill>
+                <a:latin typeface="+mn-lt"/>
+                <a:ea typeface="+mn-ea"/>
+                <a:cs typeface="+mn-cs"/>
+              </a:defRPr>
+            </a:lvl9pPr>
+          </a:lstStyle>
+          <a:p>
+            <a:pPr marL="342900" indent="-342900" algn="l">
+              <a:buFont typeface="Arial" panose="020B0604020202020204" pitchFamily="34" charset="0"/>
+              <a:buChar char="•"/>
+            </a:pPr>
+            <a:endParaRPr lang="en-US" dirty="0"/>
+          </a:p>
+        </p:txBody>
+      </p:sp>
+      <p:pic>
+        <p:nvPicPr>
+          <p:cNvPr id="1026" name="Picture 2"/>
+          <p:cNvPicPr>
+            <a:picLocks noChangeAspect="1" noChangeArrowheads="1"/>
+          </p:cNvPicPr>
+          <p:nvPr/>
+        </p:nvPicPr>
+        <p:blipFill>
+          <a:blip r:embed="rId3" cstate="print">
+            <a:extLst>
+              <a:ext uri="{28A0092B-C50C-407E-A947-70E740481C1C}">
+                <a14:useLocalDpi xmlns:a14="http://schemas.microsoft.com/office/drawing/2010/main" val="0"/>
+              </a:ext>
+            </a:extLst>
+          </a:blip>
+          <a:srcRect/>
+          <a:stretch>
+            <a:fillRect/>
+          </a:stretch>
+        </p:blipFill>
+        <p:spPr bwMode="auto">
+          <a:xfrm rot="16200000">
+            <a:off x="5642392" y="1086858"/>
+            <a:ext cx="3827520" cy="2870640"/>
+          </a:xfrm>
+          <a:prstGeom prst="rect">
+            <a:avLst/>
+          </a:prstGeom>
+          <a:noFill/>
+          <a:extLst>
+            <a:ext uri="{909E8E84-426E-40DD-AFC4-6F175D3DCCD1}">
+              <a14:hiddenFill xmlns:a14="http://schemas.microsoft.com/office/drawing/2010/main">
+                <a:solidFill>
+                  <a:srgbClr val="FFFFFF"/>
+                </a:solidFill>
+              </a14:hiddenFill>
+            </a:ext>
+          </a:extLst>
+        </p:spPr>
+      </p:pic>
+      <p:pic>
+        <p:nvPicPr>
+          <p:cNvPr id="1028" name="Picture 4"/>
+          <p:cNvPicPr>
+            <a:picLocks noChangeAspect="1" noChangeArrowheads="1"/>
+          </p:cNvPicPr>
+          <p:nvPr/>
+        </p:nvPicPr>
+        <p:blipFill>
+          <a:blip r:embed="rId4" cstate="print">
+            <a:extLst>
+              <a:ext uri="{28A0092B-C50C-407E-A947-70E740481C1C}">
+                <a14:useLocalDpi xmlns:a14="http://schemas.microsoft.com/office/drawing/2010/main" val="0"/>
+              </a:ext>
+            </a:extLst>
+          </a:blip>
+          <a:srcRect/>
+          <a:stretch>
+            <a:fillRect/>
+          </a:stretch>
+        </p:blipFill>
+        <p:spPr bwMode="auto">
+          <a:xfrm rot="16200000">
+            <a:off x="1379723" y="1048694"/>
+            <a:ext cx="3867824" cy="2899614"/>
+          </a:xfrm>
+          <a:prstGeom prst="rect">
+            <a:avLst/>
+          </a:prstGeom>
+          <a:noFill/>
+          <a:extLst>
+            <a:ext uri="{909E8E84-426E-40DD-AFC4-6F175D3DCCD1}">
+              <a14:hiddenFill xmlns:a14="http://schemas.microsoft.com/office/drawing/2010/main">
+                <a:solidFill>
+                  <a:srgbClr val="FFFFFF"/>
+                </a:solidFill>
+              </a14:hiddenFill>
+            </a:ext>
+          </a:extLst>
+        </p:spPr>
+      </p:pic>
+      <p:sp>
+        <p:nvSpPr>
+          <p:cNvPr id="3" name="TextBox 2"/>
+          <p:cNvSpPr txBox="1"/>
+          <p:nvPr/>
+        </p:nvSpPr>
+        <p:spPr>
+          <a:xfrm>
+            <a:off x="1470025" y="4636394"/>
+            <a:ext cx="8824488" cy="923330"/>
+          </a:xfrm>
+          <a:prstGeom prst="rect">
+            <a:avLst/>
+          </a:prstGeom>
+          <a:noFill/>
+        </p:spPr>
+        <p:txBody>
+          <a:bodyPr wrap="square" rtlCol="0">
+            <a:spAutoFit/>
+          </a:bodyPr>
+          <a:lstStyle/>
+          <a:p>
+            <a:r>
+              <a:rPr lang="en-US" dirty="0"/>
+              <a:t>-Game Design Document that includes a storyboard for each scenario for Array and Linked List.</a:t>
+            </a:r>
+          </a:p>
+          <a:p>
+            <a:r>
+              <a:rPr lang="en-US" dirty="0"/>
+              <a:t>-Each storyboard has a different scenario of how an Array works and Linked List work.</a:t>
+            </a:r>
+          </a:p>
+        </p:txBody>
+      </p:sp>
+    </p:spTree>
+  </p:cSld>
+  <p:clrMapOvr>
+    <a:masterClrMapping/>
+  </p:clrMapOvr>
+</p:sld>
+</file>
+
+<file path=ppt/slides/slide8.xml><?xml version="1.0" encoding="utf-8"?>
+<p:sld xmlns:a="http://schemas.openxmlformats.org/drawingml/2006/main" xmlns:r="http://schemas.openxmlformats.org/officeDocument/2006/relationships" xmlns:p="http://schemas.openxmlformats.org/presentationml/2006/main">
+  <p:cSld>
+    <p:spTree>
+      <p:nvGrpSpPr>
+        <p:cNvPr id="1" name=""/>
+        <p:cNvGrpSpPr/>
+        <p:nvPr/>
+      </p:nvGrpSpPr>
+      <p:grpSpPr>
+        <a:xfrm>
+          <a:off x="0" y="0"/>
+          <a:ext cx="0" cy="0"/>
+          <a:chOff x="0" y="0"/>
+          <a:chExt cx="0" cy="0"/>
+        </a:xfrm>
+      </p:grpSpPr>
+      <p:pic>
+        <p:nvPicPr>
+          <p:cNvPr id="7" name="Picture 6"/>
+          <p:cNvPicPr>
+            <a:picLocks noChangeAspect="1"/>
+          </p:cNvPicPr>
+          <p:nvPr/>
+        </p:nvPicPr>
+        <p:blipFill>
+          <a:blip r:embed="rId2">
+            <a:extLst>
+              <a:ext uri="{28A0092B-C50C-407E-A947-70E740481C1C}">
+                <a14:useLocalDpi xmlns:a14="http://schemas.microsoft.com/office/drawing/2010/main" val="0"/>
+              </a:ext>
+            </a:extLst>
+          </a:blip>
+          <a:stretch>
+            <a:fillRect/>
+          </a:stretch>
+        </p:blipFill>
+        <p:spPr>
+          <a:xfrm>
+            <a:off x="0" y="0"/>
+            <a:ext cx="12192000" cy="6858000"/>
+          </a:xfrm>
+          <a:prstGeom prst="rect">
+            <a:avLst/>
+          </a:prstGeom>
+        </p:spPr>
+      </p:pic>
+      <p:sp>
+        <p:nvSpPr>
           <p:cNvPr id="8" name="Subtitle 2"/>
           <p:cNvSpPr txBox="1"/>
           <p:nvPr/>
@@ -6767,7 +8139,7 @@
         </p:blipFill>
         <p:spPr>
           <a:xfrm>
-            <a:off x="4643185" y="4317880"/>
+            <a:off x="8986017" y="1382461"/>
             <a:ext cx="2327832" cy="2196548"/>
           </a:xfrm>
           <a:prstGeom prst="rect">
@@ -6931,7 +8303,7 @@
         </p:nvSpPr>
         <p:spPr>
           <a:xfrm>
-            <a:off x="4365556" y="3862763"/>
+            <a:off x="8532965" y="831177"/>
             <a:ext cx="3208062" cy="369332"/>
           </a:xfrm>
           <a:prstGeom prst="rect">
@@ -6987,41 +8359,22 @@
           </a:p>
         </p:txBody>
       </p:sp>
-    </p:spTree>
-  </p:cSld>
-  <p:clrMapOvr>
-    <a:masterClrMapping/>
-  </p:clrMapOvr>
-</p:sld>
-</file>
-
-<file path=ppt/slides/slide8.xml><?xml version="1.0" encoding="utf-8"?>
-<p:sld xmlns:a="http://schemas.openxmlformats.org/drawingml/2006/main" xmlns:r="http://schemas.openxmlformats.org/officeDocument/2006/relationships" xmlns:p="http://schemas.openxmlformats.org/presentationml/2006/main">
-  <p:cSld>
-    <p:spTree>
-      <p:nvGrpSpPr>
-        <p:cNvPr id="1" name=""/>
-        <p:cNvGrpSpPr/>
-        <p:nvPr/>
-      </p:nvGrpSpPr>
-      <p:grpSpPr>
-        <a:xfrm>
-          <a:off x="0" y="0"/>
-          <a:ext cx="0" cy="0"/>
-          <a:chOff x="0" y="0"/>
-          <a:chExt cx="0" cy="0"/>
-        </a:xfrm>
-      </p:grpSpPr>
       <p:pic>
         <p:nvPicPr>
-          <p:cNvPr id="7" name="Picture 6"/>
+          <p:cNvPr id="4" name="Picture 3">
+            <a:extLst>
+              <a:ext uri="{FF2B5EF4-FFF2-40B4-BE49-F238E27FC236}">
+                <a16:creationId xmlns:a16="http://schemas.microsoft.com/office/drawing/2014/main" id="{2410F575-6A4E-4D76-A6FD-21B958B6D424}"/>
+              </a:ext>
+            </a:extLst>
+          </p:cNvPr>
           <p:cNvPicPr>
             <a:picLocks noChangeAspect="1"/>
           </p:cNvPicPr>
           <p:nvPr/>
         </p:nvPicPr>
         <p:blipFill>
-          <a:blip r:embed="rId2">
+          <a:blip r:embed="rId7" cstate="print">
             <a:extLst>
               <a:ext uri="{28A0092B-C50C-407E-A947-70E740481C1C}">
                 <a14:useLocalDpi xmlns:a14="http://schemas.microsoft.com/office/drawing/2010/main" val="0"/>
@@ -7034,8 +8387,8 @@
         </p:blipFill>
         <p:spPr>
           <a:xfrm>
-            <a:off x="0" y="0"/>
-            <a:ext cx="12192000" cy="6858000"/>
+            <a:off x="4458748" y="2632463"/>
+            <a:ext cx="2696705" cy="2022529"/>
           </a:xfrm>
           <a:prstGeom prst="rect">
             <a:avLst/>
@@ -7044,424 +8397,35 @@
       </p:pic>
       <p:sp>
         <p:nvSpPr>
-          <p:cNvPr id="9" name="Subtitle 2"/>
+          <p:cNvPr id="17" name="TextBox 16">
+            <a:extLst>
+              <a:ext uri="{FF2B5EF4-FFF2-40B4-BE49-F238E27FC236}">
+                <a16:creationId xmlns:a16="http://schemas.microsoft.com/office/drawing/2014/main" id="{FE58756A-4E4D-4BDD-931D-7ACE5EB4D438}"/>
+              </a:ext>
+            </a:extLst>
+          </p:cNvPr>
           <p:cNvSpPr txBox="1"/>
           <p:nvPr/>
         </p:nvSpPr>
         <p:spPr>
           <a:xfrm>
-            <a:off x="539261" y="432583"/>
-            <a:ext cx="9144000" cy="1318846"/>
+            <a:off x="4437994" y="1536099"/>
+            <a:ext cx="3208062" cy="923330"/>
           </a:xfrm>
           <a:prstGeom prst="rect">
             <a:avLst/>
           </a:prstGeom>
+          <a:noFill/>
         </p:spPr>
         <p:txBody>
-          <a:bodyPr vert="horz" lIns="91440" tIns="45720" rIns="91440" bIns="45720" rtlCol="0">
-            <a:normAutofit/>
+          <a:bodyPr wrap="square" rtlCol="0">
+            <a:spAutoFit/>
           </a:bodyPr>
-          <a:lstStyle>
-            <a:lvl1pPr marL="0" indent="0" algn="ctr" defTabSz="914400" rtl="0" eaLnBrk="1" latinLnBrk="0" hangingPunct="1">
-              <a:lnSpc>
-                <a:spcPct val="90000"/>
-              </a:lnSpc>
-              <a:spcBef>
-                <a:spcPts val="1000"/>
-              </a:spcBef>
-              <a:buFont typeface="Arial" panose="020B0604020202020204" pitchFamily="34" charset="0"/>
-              <a:buNone/>
-              <a:defRPr sz="2400" kern="1200">
-                <a:solidFill>
-                  <a:schemeClr val="tx1"/>
-                </a:solidFill>
-                <a:latin typeface="+mn-lt"/>
-                <a:ea typeface="+mn-ea"/>
-                <a:cs typeface="+mn-cs"/>
-              </a:defRPr>
-            </a:lvl1pPr>
-            <a:lvl2pPr marL="457200" indent="0" algn="ctr" defTabSz="914400" rtl="0" eaLnBrk="1" latinLnBrk="0" hangingPunct="1">
-              <a:lnSpc>
-                <a:spcPct val="90000"/>
-              </a:lnSpc>
-              <a:spcBef>
-                <a:spcPts val="500"/>
-              </a:spcBef>
-              <a:buFont typeface="Arial" panose="020B0604020202020204" pitchFamily="34" charset="0"/>
-              <a:buNone/>
-              <a:defRPr sz="2000" kern="1200">
-                <a:solidFill>
-                  <a:schemeClr val="tx1"/>
-                </a:solidFill>
-                <a:latin typeface="+mn-lt"/>
-                <a:ea typeface="+mn-ea"/>
-                <a:cs typeface="+mn-cs"/>
-              </a:defRPr>
-            </a:lvl2pPr>
-            <a:lvl3pPr marL="914400" indent="0" algn="ctr" defTabSz="914400" rtl="0" eaLnBrk="1" latinLnBrk="0" hangingPunct="1">
-              <a:lnSpc>
-                <a:spcPct val="90000"/>
-              </a:lnSpc>
-              <a:spcBef>
-                <a:spcPts val="500"/>
-              </a:spcBef>
-              <a:buFont typeface="Arial" panose="020B0604020202020204" pitchFamily="34" charset="0"/>
-              <a:buNone/>
-              <a:defRPr sz="1800" kern="1200">
-                <a:solidFill>
-                  <a:schemeClr val="tx1"/>
-                </a:solidFill>
-                <a:latin typeface="+mn-lt"/>
-                <a:ea typeface="+mn-ea"/>
-                <a:cs typeface="+mn-cs"/>
-              </a:defRPr>
-            </a:lvl3pPr>
-            <a:lvl4pPr marL="1371600" indent="0" algn="ctr" defTabSz="914400" rtl="0" eaLnBrk="1" latinLnBrk="0" hangingPunct="1">
-              <a:lnSpc>
-                <a:spcPct val="90000"/>
-              </a:lnSpc>
-              <a:spcBef>
-                <a:spcPts val="500"/>
-              </a:spcBef>
-              <a:buFont typeface="Arial" panose="020B0604020202020204" pitchFamily="34" charset="0"/>
-              <a:buNone/>
-              <a:defRPr sz="1600" kern="1200">
-                <a:solidFill>
-                  <a:schemeClr val="tx1"/>
-                </a:solidFill>
-                <a:latin typeface="+mn-lt"/>
-                <a:ea typeface="+mn-ea"/>
-                <a:cs typeface="+mn-cs"/>
-              </a:defRPr>
-            </a:lvl4pPr>
-            <a:lvl5pPr marL="1828800" indent="0" algn="ctr" defTabSz="914400" rtl="0" eaLnBrk="1" latinLnBrk="0" hangingPunct="1">
-              <a:lnSpc>
-                <a:spcPct val="90000"/>
-              </a:lnSpc>
-              <a:spcBef>
-                <a:spcPts val="500"/>
-              </a:spcBef>
-              <a:buFont typeface="Arial" panose="020B0604020202020204" pitchFamily="34" charset="0"/>
-              <a:buNone/>
-              <a:defRPr sz="1600" kern="1200">
-                <a:solidFill>
-                  <a:schemeClr val="tx1"/>
-                </a:solidFill>
-                <a:latin typeface="+mn-lt"/>
-                <a:ea typeface="+mn-ea"/>
-                <a:cs typeface="+mn-cs"/>
-              </a:defRPr>
-            </a:lvl5pPr>
-            <a:lvl6pPr marL="2286000" indent="0" algn="ctr" defTabSz="914400" rtl="0" eaLnBrk="1" latinLnBrk="0" hangingPunct="1">
-              <a:lnSpc>
-                <a:spcPct val="90000"/>
-              </a:lnSpc>
-              <a:spcBef>
-                <a:spcPts val="500"/>
-              </a:spcBef>
-              <a:buFont typeface="Arial" panose="020B0604020202020204" pitchFamily="34" charset="0"/>
-              <a:buNone/>
-              <a:defRPr sz="1600" kern="1200">
-                <a:solidFill>
-                  <a:schemeClr val="tx1"/>
-                </a:solidFill>
-                <a:latin typeface="+mn-lt"/>
-                <a:ea typeface="+mn-ea"/>
-                <a:cs typeface="+mn-cs"/>
-              </a:defRPr>
-            </a:lvl6pPr>
-            <a:lvl7pPr marL="2743200" indent="0" algn="ctr" defTabSz="914400" rtl="0" eaLnBrk="1" latinLnBrk="0" hangingPunct="1">
-              <a:lnSpc>
-                <a:spcPct val="90000"/>
-              </a:lnSpc>
-              <a:spcBef>
-                <a:spcPts val="500"/>
-              </a:spcBef>
-              <a:buFont typeface="Arial" panose="020B0604020202020204" pitchFamily="34" charset="0"/>
-              <a:buNone/>
-              <a:defRPr sz="1600" kern="1200">
-                <a:solidFill>
-                  <a:schemeClr val="tx1"/>
-                </a:solidFill>
-                <a:latin typeface="+mn-lt"/>
-                <a:ea typeface="+mn-ea"/>
-                <a:cs typeface="+mn-cs"/>
-              </a:defRPr>
-            </a:lvl7pPr>
-            <a:lvl8pPr marL="3200400" indent="0" algn="ctr" defTabSz="914400" rtl="0" eaLnBrk="1" latinLnBrk="0" hangingPunct="1">
-              <a:lnSpc>
-                <a:spcPct val="90000"/>
-              </a:lnSpc>
-              <a:spcBef>
-                <a:spcPts val="500"/>
-              </a:spcBef>
-              <a:buFont typeface="Arial" panose="020B0604020202020204" pitchFamily="34" charset="0"/>
-              <a:buNone/>
-              <a:defRPr sz="1600" kern="1200">
-                <a:solidFill>
-                  <a:schemeClr val="tx1"/>
-                </a:solidFill>
-                <a:latin typeface="+mn-lt"/>
-                <a:ea typeface="+mn-ea"/>
-                <a:cs typeface="+mn-cs"/>
-              </a:defRPr>
-            </a:lvl8pPr>
-            <a:lvl9pPr marL="3657600" indent="0" algn="ctr" defTabSz="914400" rtl="0" eaLnBrk="1" latinLnBrk="0" hangingPunct="1">
-              <a:lnSpc>
-                <a:spcPct val="90000"/>
-              </a:lnSpc>
-              <a:spcBef>
-                <a:spcPts val="500"/>
-              </a:spcBef>
-              <a:buFont typeface="Arial" panose="020B0604020202020204" pitchFamily="34" charset="0"/>
-              <a:buNone/>
-              <a:defRPr sz="1600" kern="1200">
-                <a:solidFill>
-                  <a:schemeClr val="tx1"/>
-                </a:solidFill>
-                <a:latin typeface="+mn-lt"/>
-                <a:ea typeface="+mn-ea"/>
-                <a:cs typeface="+mn-cs"/>
-              </a:defRPr>
-            </a:lvl9pPr>
-          </a:lstStyle>
-          <a:p>
-            <a:pPr algn="l"/>
-            <a:r>
-              <a:rPr lang="en-US" sz="4000" dirty="0">
-                <a:latin typeface="Century Gothic" panose="020B0502020202020204" pitchFamily="34" charset="0"/>
-              </a:rPr>
-              <a:t>Target Market</a:t>
-            </a:r>
-          </a:p>
-        </p:txBody>
-      </p:sp>
-      <p:pic>
-        <p:nvPicPr>
-          <p:cNvPr id="11" name="Picture 10" descr="A black sign with white text&#10;&#10;Description automatically generated"/>
-          <p:cNvPicPr>
-            <a:picLocks noChangeAspect="1"/>
-          </p:cNvPicPr>
-          <p:nvPr/>
-        </p:nvPicPr>
-        <p:blipFill>
-          <a:blip r:embed="rId3">
-            <a:extLst>
-              <a:ext uri="{28A0092B-C50C-407E-A947-70E740481C1C}">
-                <a14:useLocalDpi xmlns:a14="http://schemas.microsoft.com/office/drawing/2010/main" val="0"/>
-              </a:ext>
-            </a:extLst>
-          </a:blip>
-          <a:stretch>
-            <a:fillRect/>
-          </a:stretch>
-        </p:blipFill>
-        <p:spPr>
-          <a:xfrm>
-            <a:off x="425621" y="5106571"/>
-            <a:ext cx="1446907" cy="1467877"/>
-          </a:xfrm>
-          <a:prstGeom prst="rect">
-            <a:avLst/>
-          </a:prstGeom>
-        </p:spPr>
-      </p:pic>
-      <p:sp>
-        <p:nvSpPr>
-          <p:cNvPr id="8" name="Subtitle 2"/>
-          <p:cNvSpPr txBox="1"/>
-          <p:nvPr/>
-        </p:nvSpPr>
-        <p:spPr>
-          <a:xfrm>
-            <a:off x="2255521" y="2036295"/>
-            <a:ext cx="8449993" cy="2690449"/>
-          </a:xfrm>
-          <a:prstGeom prst="rect">
-            <a:avLst/>
-          </a:prstGeom>
-        </p:spPr>
-        <p:txBody>
-          <a:bodyPr vert="horz" lIns="91440" tIns="45720" rIns="91440" bIns="45720" rtlCol="0">
-            <a:normAutofit/>
-          </a:bodyPr>
-          <a:lstStyle>
-            <a:lvl1pPr marL="0" indent="0" algn="ctr" defTabSz="914400" rtl="0" eaLnBrk="1" latinLnBrk="0" hangingPunct="1">
-              <a:lnSpc>
-                <a:spcPct val="90000"/>
-              </a:lnSpc>
-              <a:spcBef>
-                <a:spcPts val="1000"/>
-              </a:spcBef>
-              <a:buFont typeface="Arial" panose="020B0604020202020204" pitchFamily="34" charset="0"/>
-              <a:buNone/>
-              <a:defRPr sz="2400" kern="1200">
-                <a:solidFill>
-                  <a:schemeClr val="tx1"/>
-                </a:solidFill>
-                <a:latin typeface="+mn-lt"/>
-                <a:ea typeface="+mn-ea"/>
-                <a:cs typeface="+mn-cs"/>
-              </a:defRPr>
-            </a:lvl1pPr>
-            <a:lvl2pPr marL="457200" indent="0" algn="ctr" defTabSz="914400" rtl="0" eaLnBrk="1" latinLnBrk="0" hangingPunct="1">
-              <a:lnSpc>
-                <a:spcPct val="90000"/>
-              </a:lnSpc>
-              <a:spcBef>
-                <a:spcPts val="500"/>
-              </a:spcBef>
-              <a:buFont typeface="Arial" panose="020B0604020202020204" pitchFamily="34" charset="0"/>
-              <a:buNone/>
-              <a:defRPr sz="2000" kern="1200">
-                <a:solidFill>
-                  <a:schemeClr val="tx1"/>
-                </a:solidFill>
-                <a:latin typeface="+mn-lt"/>
-                <a:ea typeface="+mn-ea"/>
-                <a:cs typeface="+mn-cs"/>
-              </a:defRPr>
-            </a:lvl2pPr>
-            <a:lvl3pPr marL="914400" indent="0" algn="ctr" defTabSz="914400" rtl="0" eaLnBrk="1" latinLnBrk="0" hangingPunct="1">
-              <a:lnSpc>
-                <a:spcPct val="90000"/>
-              </a:lnSpc>
-              <a:spcBef>
-                <a:spcPts val="500"/>
-              </a:spcBef>
-              <a:buFont typeface="Arial" panose="020B0604020202020204" pitchFamily="34" charset="0"/>
-              <a:buNone/>
-              <a:defRPr sz="1800" kern="1200">
-                <a:solidFill>
-                  <a:schemeClr val="tx1"/>
-                </a:solidFill>
-                <a:latin typeface="+mn-lt"/>
-                <a:ea typeface="+mn-ea"/>
-                <a:cs typeface="+mn-cs"/>
-              </a:defRPr>
-            </a:lvl3pPr>
-            <a:lvl4pPr marL="1371600" indent="0" algn="ctr" defTabSz="914400" rtl="0" eaLnBrk="1" latinLnBrk="0" hangingPunct="1">
-              <a:lnSpc>
-                <a:spcPct val="90000"/>
-              </a:lnSpc>
-              <a:spcBef>
-                <a:spcPts val="500"/>
-              </a:spcBef>
-              <a:buFont typeface="Arial" panose="020B0604020202020204" pitchFamily="34" charset="0"/>
-              <a:buNone/>
-              <a:defRPr sz="1600" kern="1200">
-                <a:solidFill>
-                  <a:schemeClr val="tx1"/>
-                </a:solidFill>
-                <a:latin typeface="+mn-lt"/>
-                <a:ea typeface="+mn-ea"/>
-                <a:cs typeface="+mn-cs"/>
-              </a:defRPr>
-            </a:lvl4pPr>
-            <a:lvl5pPr marL="1828800" indent="0" algn="ctr" defTabSz="914400" rtl="0" eaLnBrk="1" latinLnBrk="0" hangingPunct="1">
-              <a:lnSpc>
-                <a:spcPct val="90000"/>
-              </a:lnSpc>
-              <a:spcBef>
-                <a:spcPts val="500"/>
-              </a:spcBef>
-              <a:buFont typeface="Arial" panose="020B0604020202020204" pitchFamily="34" charset="0"/>
-              <a:buNone/>
-              <a:defRPr sz="1600" kern="1200">
-                <a:solidFill>
-                  <a:schemeClr val="tx1"/>
-                </a:solidFill>
-                <a:latin typeface="+mn-lt"/>
-                <a:ea typeface="+mn-ea"/>
-                <a:cs typeface="+mn-cs"/>
-              </a:defRPr>
-            </a:lvl5pPr>
-            <a:lvl6pPr marL="2286000" indent="0" algn="ctr" defTabSz="914400" rtl="0" eaLnBrk="1" latinLnBrk="0" hangingPunct="1">
-              <a:lnSpc>
-                <a:spcPct val="90000"/>
-              </a:lnSpc>
-              <a:spcBef>
-                <a:spcPts val="500"/>
-              </a:spcBef>
-              <a:buFont typeface="Arial" panose="020B0604020202020204" pitchFamily="34" charset="0"/>
-              <a:buNone/>
-              <a:defRPr sz="1600" kern="1200">
-                <a:solidFill>
-                  <a:schemeClr val="tx1"/>
-                </a:solidFill>
-                <a:latin typeface="+mn-lt"/>
-                <a:ea typeface="+mn-ea"/>
-                <a:cs typeface="+mn-cs"/>
-              </a:defRPr>
-            </a:lvl6pPr>
-            <a:lvl7pPr marL="2743200" indent="0" algn="ctr" defTabSz="914400" rtl="0" eaLnBrk="1" latinLnBrk="0" hangingPunct="1">
-              <a:lnSpc>
-                <a:spcPct val="90000"/>
-              </a:lnSpc>
-              <a:spcBef>
-                <a:spcPts val="500"/>
-              </a:spcBef>
-              <a:buFont typeface="Arial" panose="020B0604020202020204" pitchFamily="34" charset="0"/>
-              <a:buNone/>
-              <a:defRPr sz="1600" kern="1200">
-                <a:solidFill>
-                  <a:schemeClr val="tx1"/>
-                </a:solidFill>
-                <a:latin typeface="+mn-lt"/>
-                <a:ea typeface="+mn-ea"/>
-                <a:cs typeface="+mn-cs"/>
-              </a:defRPr>
-            </a:lvl7pPr>
-            <a:lvl8pPr marL="3200400" indent="0" algn="ctr" defTabSz="914400" rtl="0" eaLnBrk="1" latinLnBrk="0" hangingPunct="1">
-              <a:lnSpc>
-                <a:spcPct val="90000"/>
-              </a:lnSpc>
-              <a:spcBef>
-                <a:spcPts val="500"/>
-              </a:spcBef>
-              <a:buFont typeface="Arial" panose="020B0604020202020204" pitchFamily="34" charset="0"/>
-              <a:buNone/>
-              <a:defRPr sz="1600" kern="1200">
-                <a:solidFill>
-                  <a:schemeClr val="tx1"/>
-                </a:solidFill>
-                <a:latin typeface="+mn-lt"/>
-                <a:ea typeface="+mn-ea"/>
-                <a:cs typeface="+mn-cs"/>
-              </a:defRPr>
-            </a:lvl8pPr>
-            <a:lvl9pPr marL="3657600" indent="0" algn="ctr" defTabSz="914400" rtl="0" eaLnBrk="1" latinLnBrk="0" hangingPunct="1">
-              <a:lnSpc>
-                <a:spcPct val="90000"/>
-              </a:lnSpc>
-              <a:spcBef>
-                <a:spcPts val="500"/>
-              </a:spcBef>
-              <a:buFont typeface="Arial" panose="020B0604020202020204" pitchFamily="34" charset="0"/>
-              <a:buNone/>
-              <a:defRPr sz="1600" kern="1200">
-                <a:solidFill>
-                  <a:schemeClr val="tx1"/>
-                </a:solidFill>
-                <a:latin typeface="+mn-lt"/>
-                <a:ea typeface="+mn-ea"/>
-                <a:cs typeface="+mn-cs"/>
-              </a:defRPr>
-            </a:lvl9pPr>
-          </a:lstStyle>
-          <a:p>
-            <a:pPr algn="l"/>
+          <a:lstStyle/>
+          <a:p>
             <a:r>
               <a:rPr lang="en-US" dirty="0"/>
-              <a:t>This project focus on educational yet fun games similar to the Humongous Entertainment games but giving it a new kind of edge of getting into Data Structure to </a:t>
-            </a:r>
-            <a:r>
-              <a:rPr lang="en-US"/>
-              <a:t>get teenagers </a:t>
-            </a:r>
-            <a:r>
-              <a:rPr lang="en-US" dirty="0"/>
-              <a:t>and upcoming people to get used to it.</a:t>
+              <a:t>Instructions and playthrough with sense of humor to have the fun feel.</a:t>
             </a:r>
           </a:p>
         </p:txBody>
@@ -7710,7 +8674,7 @@
               <a:rPr lang="en-US" sz="4000" dirty="0">
                 <a:latin typeface="Century Gothic" panose="020B0502020202020204" pitchFamily="34" charset="0"/>
               </a:rPr>
-              <a:t>Prior Art</a:t>
+              <a:t>Target Market</a:t>
             </a:r>
           </a:p>
         </p:txBody>
@@ -7747,14 +8711,14 @@
       </p:pic>
       <p:sp>
         <p:nvSpPr>
-          <p:cNvPr id="6" name="Subtitle 2"/>
+          <p:cNvPr id="8" name="Subtitle 2"/>
           <p:cNvSpPr txBox="1"/>
           <p:nvPr/>
         </p:nvSpPr>
         <p:spPr>
           <a:xfrm>
-            <a:off x="665871" y="1294228"/>
-            <a:ext cx="10813365" cy="3528791"/>
+            <a:off x="2255521" y="2036295"/>
+            <a:ext cx="8449993" cy="2690449"/>
           </a:xfrm>
           <a:prstGeom prst="rect">
             <a:avLst/>
@@ -7932,252 +8896,8 @@
             <a:pPr algn="l"/>
             <a:r>
               <a:rPr lang="en-US" dirty="0"/>
-              <a:t>Swift Playgrounds (iPad App)</a:t>
-            </a:r>
-            <a:r>
-              <a:rPr lang="en-US" dirty="0">
-                <a:hlinkClick r:id="rId4"/>
-              </a:rPr>
-              <a:t> https://www.apple.com/swift/playgrounds/</a:t>
-            </a:r>
-            <a:r>
-              <a:rPr lang="en-US" dirty="0"/>
-              <a:t> </a:t>
-            </a:r>
-          </a:p>
-          <a:p>
-            <a:pPr algn="l"/>
-            <a:r>
-              <a:rPr lang="en-US" dirty="0"/>
-              <a:t>Humongous Entertainment Games </a:t>
-            </a:r>
-            <a:r>
-              <a:rPr lang="en-US" dirty="0">
-                <a:hlinkClick r:id="rId5"/>
-              </a:rPr>
-              <a:t>http://humongous.com/</a:t>
-            </a:r>
-            <a:r>
-              <a:rPr lang="en-US" dirty="0"/>
-              <a:t> </a:t>
-            </a:r>
-          </a:p>
-          <a:p>
-            <a:pPr algn="l"/>
-            <a:r>
-              <a:rPr lang="en-US" dirty="0"/>
-              <a:t>Portal </a:t>
-            </a:r>
-            <a:r>
-              <a:rPr lang="en-US" dirty="0">
-                <a:hlinkClick r:id="rId6"/>
-              </a:rPr>
-              <a:t>https://store.steampowered.com/app/400/Portal/</a:t>
-            </a:r>
-            <a:r>
-              <a:rPr lang="en-US" dirty="0"/>
-              <a:t> </a:t>
-            </a:r>
-          </a:p>
-          <a:p>
-            <a:pPr algn="l"/>
-            <a:r>
-              <a:rPr lang="en-US" dirty="0"/>
-              <a:t>Human Resources Machine</a:t>
-            </a:r>
-          </a:p>
-          <a:p>
-            <a:pPr algn="l"/>
-            <a:endParaRPr lang="en-US" dirty="0"/>
-          </a:p>
-        </p:txBody>
-      </p:sp>
-      <p:sp>
-        <p:nvSpPr>
-          <p:cNvPr id="8" name="Subtitle 2"/>
-          <p:cNvSpPr txBox="1"/>
-          <p:nvPr/>
-        </p:nvSpPr>
-        <p:spPr>
-          <a:xfrm>
-            <a:off x="2717409" y="6261442"/>
-            <a:ext cx="7087772" cy="313006"/>
-          </a:xfrm>
-          <a:prstGeom prst="rect">
-            <a:avLst/>
-          </a:prstGeom>
-        </p:spPr>
-        <p:txBody>
-          <a:bodyPr vert="horz" lIns="91440" tIns="45720" rIns="91440" bIns="45720" rtlCol="0">
-            <a:normAutofit/>
-          </a:bodyPr>
-          <a:lstStyle>
-            <a:lvl1pPr marL="0" indent="0" algn="ctr" defTabSz="914400" rtl="0" eaLnBrk="1" latinLnBrk="0" hangingPunct="1">
-              <a:lnSpc>
-                <a:spcPct val="90000"/>
-              </a:lnSpc>
-              <a:spcBef>
-                <a:spcPts val="1000"/>
-              </a:spcBef>
-              <a:buFont typeface="Arial" panose="020B0604020202020204" pitchFamily="34" charset="0"/>
-              <a:buNone/>
-              <a:defRPr sz="2400" kern="1200">
-                <a:solidFill>
-                  <a:schemeClr val="tx1"/>
-                </a:solidFill>
-                <a:latin typeface="+mn-lt"/>
-                <a:ea typeface="+mn-ea"/>
-                <a:cs typeface="+mn-cs"/>
-              </a:defRPr>
-            </a:lvl1pPr>
-            <a:lvl2pPr marL="457200" indent="0" algn="ctr" defTabSz="914400" rtl="0" eaLnBrk="1" latinLnBrk="0" hangingPunct="1">
-              <a:lnSpc>
-                <a:spcPct val="90000"/>
-              </a:lnSpc>
-              <a:spcBef>
-                <a:spcPts val="500"/>
-              </a:spcBef>
-              <a:buFont typeface="Arial" panose="020B0604020202020204" pitchFamily="34" charset="0"/>
-              <a:buNone/>
-              <a:defRPr sz="2000" kern="1200">
-                <a:solidFill>
-                  <a:schemeClr val="tx1"/>
-                </a:solidFill>
-                <a:latin typeface="+mn-lt"/>
-                <a:ea typeface="+mn-ea"/>
-                <a:cs typeface="+mn-cs"/>
-              </a:defRPr>
-            </a:lvl2pPr>
-            <a:lvl3pPr marL="914400" indent="0" algn="ctr" defTabSz="914400" rtl="0" eaLnBrk="1" latinLnBrk="0" hangingPunct="1">
-              <a:lnSpc>
-                <a:spcPct val="90000"/>
-              </a:lnSpc>
-              <a:spcBef>
-                <a:spcPts val="500"/>
-              </a:spcBef>
-              <a:buFont typeface="Arial" panose="020B0604020202020204" pitchFamily="34" charset="0"/>
-              <a:buNone/>
-              <a:defRPr sz="1800" kern="1200">
-                <a:solidFill>
-                  <a:schemeClr val="tx1"/>
-                </a:solidFill>
-                <a:latin typeface="+mn-lt"/>
-                <a:ea typeface="+mn-ea"/>
-                <a:cs typeface="+mn-cs"/>
-              </a:defRPr>
-            </a:lvl3pPr>
-            <a:lvl4pPr marL="1371600" indent="0" algn="ctr" defTabSz="914400" rtl="0" eaLnBrk="1" latinLnBrk="0" hangingPunct="1">
-              <a:lnSpc>
-                <a:spcPct val="90000"/>
-              </a:lnSpc>
-              <a:spcBef>
-                <a:spcPts val="500"/>
-              </a:spcBef>
-              <a:buFont typeface="Arial" panose="020B0604020202020204" pitchFamily="34" charset="0"/>
-              <a:buNone/>
-              <a:defRPr sz="1600" kern="1200">
-                <a:solidFill>
-                  <a:schemeClr val="tx1"/>
-                </a:solidFill>
-                <a:latin typeface="+mn-lt"/>
-                <a:ea typeface="+mn-ea"/>
-                <a:cs typeface="+mn-cs"/>
-              </a:defRPr>
-            </a:lvl4pPr>
-            <a:lvl5pPr marL="1828800" indent="0" algn="ctr" defTabSz="914400" rtl="0" eaLnBrk="1" latinLnBrk="0" hangingPunct="1">
-              <a:lnSpc>
-                <a:spcPct val="90000"/>
-              </a:lnSpc>
-              <a:spcBef>
-                <a:spcPts val="500"/>
-              </a:spcBef>
-              <a:buFont typeface="Arial" panose="020B0604020202020204" pitchFamily="34" charset="0"/>
-              <a:buNone/>
-              <a:defRPr sz="1600" kern="1200">
-                <a:solidFill>
-                  <a:schemeClr val="tx1"/>
-                </a:solidFill>
-                <a:latin typeface="+mn-lt"/>
-                <a:ea typeface="+mn-ea"/>
-                <a:cs typeface="+mn-cs"/>
-              </a:defRPr>
-            </a:lvl5pPr>
-            <a:lvl6pPr marL="2286000" indent="0" algn="ctr" defTabSz="914400" rtl="0" eaLnBrk="1" latinLnBrk="0" hangingPunct="1">
-              <a:lnSpc>
-                <a:spcPct val="90000"/>
-              </a:lnSpc>
-              <a:spcBef>
-                <a:spcPts val="500"/>
-              </a:spcBef>
-              <a:buFont typeface="Arial" panose="020B0604020202020204" pitchFamily="34" charset="0"/>
-              <a:buNone/>
-              <a:defRPr sz="1600" kern="1200">
-                <a:solidFill>
-                  <a:schemeClr val="tx1"/>
-                </a:solidFill>
-                <a:latin typeface="+mn-lt"/>
-                <a:ea typeface="+mn-ea"/>
-                <a:cs typeface="+mn-cs"/>
-              </a:defRPr>
-            </a:lvl6pPr>
-            <a:lvl7pPr marL="2743200" indent="0" algn="ctr" defTabSz="914400" rtl="0" eaLnBrk="1" latinLnBrk="0" hangingPunct="1">
-              <a:lnSpc>
-                <a:spcPct val="90000"/>
-              </a:lnSpc>
-              <a:spcBef>
-                <a:spcPts val="500"/>
-              </a:spcBef>
-              <a:buFont typeface="Arial" panose="020B0604020202020204" pitchFamily="34" charset="0"/>
-              <a:buNone/>
-              <a:defRPr sz="1600" kern="1200">
-                <a:solidFill>
-                  <a:schemeClr val="tx1"/>
-                </a:solidFill>
-                <a:latin typeface="+mn-lt"/>
-                <a:ea typeface="+mn-ea"/>
-                <a:cs typeface="+mn-cs"/>
-              </a:defRPr>
-            </a:lvl7pPr>
-            <a:lvl8pPr marL="3200400" indent="0" algn="ctr" defTabSz="914400" rtl="0" eaLnBrk="1" latinLnBrk="0" hangingPunct="1">
-              <a:lnSpc>
-                <a:spcPct val="90000"/>
-              </a:lnSpc>
-              <a:spcBef>
-                <a:spcPts val="500"/>
-              </a:spcBef>
-              <a:buFont typeface="Arial" panose="020B0604020202020204" pitchFamily="34" charset="0"/>
-              <a:buNone/>
-              <a:defRPr sz="1600" kern="1200">
-                <a:solidFill>
-                  <a:schemeClr val="tx1"/>
-                </a:solidFill>
-                <a:latin typeface="+mn-lt"/>
-                <a:ea typeface="+mn-ea"/>
-                <a:cs typeface="+mn-cs"/>
-              </a:defRPr>
-            </a:lvl8pPr>
-            <a:lvl9pPr marL="3657600" indent="0" algn="ctr" defTabSz="914400" rtl="0" eaLnBrk="1" latinLnBrk="0" hangingPunct="1">
-              <a:lnSpc>
-                <a:spcPct val="90000"/>
-              </a:lnSpc>
-              <a:spcBef>
-                <a:spcPts val="500"/>
-              </a:spcBef>
-              <a:buFont typeface="Arial" panose="020B0604020202020204" pitchFamily="34" charset="0"/>
-              <a:buNone/>
-              <a:defRPr sz="1600" kern="1200">
-                <a:solidFill>
-                  <a:schemeClr val="tx1"/>
-                </a:solidFill>
-                <a:latin typeface="+mn-lt"/>
-                <a:ea typeface="+mn-ea"/>
-                <a:cs typeface="+mn-cs"/>
-              </a:defRPr>
-            </a:lvl9pPr>
-          </a:lstStyle>
-          <a:p>
-            <a:pPr algn="l"/>
-            <a:endParaRPr lang="en-US" sz="1600" i="1" dirty="0"/>
+              <a:t>This project focus on educational yet fun games similar to the Humongous Entertainment games but giving it a new kind of edge of getting into Data Structure to get teenagers and upcoming people to get used to it.</a:t>
+            </a:r>
           </a:p>
         </p:txBody>
       </p:sp>

</xml_diff>